<commit_message>
Merged input from Benoit. Part1.
</commit_message>
<xml_diff>
--- a/draft-tgraf-opsawg-ipfix-inband-telemetry-00.pptx
+++ b/draft-tgraf-opsawg-ipfix-inband-telemetry-00.pptx
@@ -927,7 +927,7 @@
           <a:p>
             <a:fld id="{E5E705E9-673F-4AC4-B29E-A7B26F3B8523}" type="datetimeFigureOut">
               <a:rPr lang="de-CH" smtClean="0"/>
-              <a:t>16.07.2022</a:t>
+              <a:t>19.07.2022</a:t>
             </a:fld>
             <a:endParaRPr lang="de-CH"/>
           </a:p>
@@ -1428,7 +1428,7 @@
           <a:p>
             <a:fld id="{9E9B238C-2335-4007-98C9-471C02CC43B6}" type="datetimeFigureOut">
               <a:rPr lang="de-CH" smtClean="0"/>
-              <a:t>16.07.2022</a:t>
+              <a:t>19.07.2022</a:t>
             </a:fld>
             <a:endParaRPr lang="de-CH"/>
           </a:p>
@@ -1628,7 +1628,7 @@
           <a:p>
             <a:fld id="{9E9B238C-2335-4007-98C9-471C02CC43B6}" type="datetimeFigureOut">
               <a:rPr lang="de-CH" smtClean="0"/>
-              <a:t>16.07.2022</a:t>
+              <a:t>19.07.2022</a:t>
             </a:fld>
             <a:endParaRPr lang="de-CH"/>
           </a:p>
@@ -1838,7 +1838,7 @@
           <a:p>
             <a:fld id="{9E9B238C-2335-4007-98C9-471C02CC43B6}" type="datetimeFigureOut">
               <a:rPr lang="de-CH" smtClean="0"/>
-              <a:t>16.07.2022</a:t>
+              <a:t>19.07.2022</a:t>
             </a:fld>
             <a:endParaRPr lang="de-CH"/>
           </a:p>
@@ -2267,7 +2267,7 @@
           <a:p>
             <a:fld id="{9E9B238C-2335-4007-98C9-471C02CC43B6}" type="datetimeFigureOut">
               <a:rPr lang="de-CH" smtClean="0"/>
-              <a:t>16.07.2022</a:t>
+              <a:t>19.07.2022</a:t>
             </a:fld>
             <a:endParaRPr lang="de-CH"/>
           </a:p>
@@ -2543,7 +2543,7 @@
           <a:p>
             <a:fld id="{9E9B238C-2335-4007-98C9-471C02CC43B6}" type="datetimeFigureOut">
               <a:rPr lang="de-CH" smtClean="0"/>
-              <a:t>16.07.2022</a:t>
+              <a:t>19.07.2022</a:t>
             </a:fld>
             <a:endParaRPr lang="de-CH"/>
           </a:p>
@@ -2811,7 +2811,7 @@
           <a:p>
             <a:fld id="{9E9B238C-2335-4007-98C9-471C02CC43B6}" type="datetimeFigureOut">
               <a:rPr lang="de-CH" smtClean="0"/>
-              <a:t>16.07.2022</a:t>
+              <a:t>19.07.2022</a:t>
             </a:fld>
             <a:endParaRPr lang="de-CH"/>
           </a:p>
@@ -3226,7 +3226,7 @@
           <a:p>
             <a:fld id="{9E9B238C-2335-4007-98C9-471C02CC43B6}" type="datetimeFigureOut">
               <a:rPr lang="de-CH" smtClean="0"/>
-              <a:t>16.07.2022</a:t>
+              <a:t>19.07.2022</a:t>
             </a:fld>
             <a:endParaRPr lang="de-CH"/>
           </a:p>
@@ -3368,7 +3368,7 @@
           <a:p>
             <a:fld id="{9E9B238C-2335-4007-98C9-471C02CC43B6}" type="datetimeFigureOut">
               <a:rPr lang="de-CH" smtClean="0"/>
-              <a:t>16.07.2022</a:t>
+              <a:t>19.07.2022</a:t>
             </a:fld>
             <a:endParaRPr lang="de-CH"/>
           </a:p>
@@ -3481,7 +3481,7 @@
           <a:p>
             <a:fld id="{9E9B238C-2335-4007-98C9-471C02CC43B6}" type="datetimeFigureOut">
               <a:rPr lang="de-CH" smtClean="0"/>
-              <a:t>16.07.2022</a:t>
+              <a:t>19.07.2022</a:t>
             </a:fld>
             <a:endParaRPr lang="de-CH"/>
           </a:p>
@@ -3794,7 +3794,7 @@
           <a:p>
             <a:fld id="{9E9B238C-2335-4007-98C9-471C02CC43B6}" type="datetimeFigureOut">
               <a:rPr lang="de-CH" smtClean="0"/>
-              <a:t>16.07.2022</a:t>
+              <a:t>19.07.2022</a:t>
             </a:fld>
             <a:endParaRPr lang="de-CH"/>
           </a:p>
@@ -4083,7 +4083,7 @@
           <a:p>
             <a:fld id="{9E9B238C-2335-4007-98C9-471C02CC43B6}" type="datetimeFigureOut">
               <a:rPr lang="de-CH" smtClean="0"/>
-              <a:t>16.07.2022</a:t>
+              <a:t>19.07.2022</a:t>
             </a:fld>
             <a:endParaRPr lang="de-CH"/>
           </a:p>
@@ -4326,7 +4326,7 @@
           <a:p>
             <a:fld id="{9E9B238C-2335-4007-98C9-471C02CC43B6}" type="datetimeFigureOut">
               <a:rPr lang="de-CH" smtClean="0"/>
-              <a:t>16.07.2022</a:t>
+              <a:t>19.07.2022</a:t>
             </a:fld>
             <a:endParaRPr lang="de-CH"/>
           </a:p>
@@ -5225,7 +5225,7 @@
         </p:spPr>
         <p:txBody>
           <a:bodyPr>
-            <a:normAutofit/>
+            <a:normAutofit lnSpcReduction="10000"/>
           </a:bodyPr>
           <a:lstStyle/>
           <a:p>
@@ -5290,28 +5290,6 @@
             <a:r>
               <a:rPr lang="en-US" sz="1700" dirty="0"/>
               <a:t>. </a:t>
-            </a:r>
-          </a:p>
-          <a:p>
-            <a:pPr marL="285750" indent="-285750">
-              <a:spcBef>
-                <a:spcPts val="300"/>
-              </a:spcBef>
-              <a:spcAft>
-                <a:spcPts val="300"/>
-              </a:spcAft>
-            </a:pPr>
-            <a:r>
-              <a:rPr lang="en-US" sz="1700" b="1" dirty="0"/>
-              <a:t>IPFIX lacks the ability to measure delay. </a:t>
-            </a:r>
-            <a:r>
-              <a:rPr lang="en-US" sz="1700" dirty="0"/>
-              <a:t>A key element for monitoring </a:t>
-            </a:r>
-            <a:r>
-              <a:rPr lang="en-US" sz="1700" b="1" dirty="0"/>
-              <a:t>Customer Service Level Agreements.</a:t>
             </a:r>
           </a:p>
           <a:p>
@@ -5374,36 +5352,62 @@
               <a:spcAft>
                 <a:spcPts val="300"/>
               </a:spcAft>
-              <a:buFont typeface="Arial" panose="020B0604020202020204" pitchFamily="34" charset="0"/>
-              <a:buChar char="•"/>
             </a:pPr>
             <a:r>
-              <a:rPr lang="en-US" sz="1700" b="1" dirty="0" err="1"/>
-              <a:t>Inband</a:t>
+              <a:rPr lang="de-CH" sz="1700" b="1" dirty="0"/>
+              <a:t>IPFIX </a:t>
+            </a:r>
+            <a:r>
+              <a:rPr lang="de-CH" sz="1700" b="1" dirty="0" err="1"/>
+              <a:t>lacks</a:t>
+            </a:r>
+            <a:r>
+              <a:rPr lang="de-CH" sz="1700" b="1" dirty="0"/>
+              <a:t> </a:t>
+            </a:r>
+            <a:r>
+              <a:rPr lang="de-CH" sz="1700" b="1" dirty="0" err="1"/>
+              <a:t>the</a:t>
+            </a:r>
+            <a:r>
+              <a:rPr lang="de-CH" sz="1700" b="1" dirty="0"/>
+              <a:t> </a:t>
+            </a:r>
+            <a:r>
+              <a:rPr lang="de-CH" sz="1700" b="1" dirty="0" err="1"/>
+              <a:t>ability</a:t>
+            </a:r>
+            <a:r>
+              <a:rPr lang="de-CH" sz="1700" b="1" dirty="0"/>
+              <a:t> </a:t>
+            </a:r>
+            <a:r>
+              <a:rPr lang="de-CH" sz="1700" b="1" dirty="0" err="1"/>
+              <a:t>to</a:t>
+            </a:r>
+            <a:r>
+              <a:rPr lang="de-CH" sz="1700" b="1" dirty="0"/>
+              <a:t> </a:t>
+            </a:r>
+            <a:r>
+              <a:rPr lang="de-CH" sz="1700" b="1" dirty="0" err="1"/>
+              <a:t>export</a:t>
+            </a:r>
+            <a:r>
+              <a:rPr lang="de-CH" sz="1700" b="1" dirty="0"/>
+              <a:t> </a:t>
+            </a:r>
+            <a:r>
+              <a:rPr lang="de-CH" sz="1700" b="1" dirty="0" err="1"/>
+              <a:t>delay</a:t>
             </a:r>
             <a:r>
               <a:rPr lang="en-US" sz="1700" b="1" dirty="0"/>
-              <a:t> Telemetry lacks Flow Aggregation support </a:t>
+              <a:t>. </a:t>
             </a:r>
             <a:r>
               <a:rPr lang="en-US" sz="1700" dirty="0"/>
-              <a:t>as defined in RFC 7015. Therefore, </a:t>
-            </a:r>
-            <a:r>
-              <a:rPr lang="en-US" sz="1700" b="1" dirty="0"/>
-              <a:t>scalability</a:t>
-            </a:r>
-            <a:r>
-              <a:rPr lang="en-US" sz="1700" dirty="0"/>
-              <a:t> in terms of data export and collection is </a:t>
-            </a:r>
-            <a:r>
-              <a:rPr lang="en-US" sz="1700" b="1" dirty="0"/>
-              <a:t>drastically limited </a:t>
-            </a:r>
-            <a:r>
-              <a:rPr lang="en-US" sz="1700" dirty="0"/>
-              <a:t>today.</a:t>
+              <a:t>A key element for monitoring Customer Service Level Agreements.</a:t>
             </a:r>
           </a:p>
           <a:p>
@@ -5418,6 +5422,46 @@
               <a:buChar char="•"/>
             </a:pPr>
             <a:r>
+              <a:rPr lang="en-US" sz="1700" b="1" dirty="0" err="1"/>
+              <a:t>Inband</a:t>
+            </a:r>
+            <a:r>
+              <a:rPr lang="en-US" sz="1700" b="1" dirty="0"/>
+              <a:t> Telemetry lacks Flow Aggregation support </a:t>
+            </a:r>
+            <a:r>
+              <a:rPr lang="en-US" sz="1700" dirty="0"/>
+              <a:t>as defined in RFC 7015. Therefore, </a:t>
+            </a:r>
+            <a:r>
+              <a:rPr lang="en-US" sz="1700" b="1" dirty="0"/>
+              <a:t>scalability</a:t>
+            </a:r>
+            <a:r>
+              <a:rPr lang="en-US" sz="1700" dirty="0"/>
+              <a:t> in terms of data export and collection is </a:t>
+            </a:r>
+            <a:r>
+              <a:rPr lang="en-US" sz="1700" b="1" dirty="0"/>
+              <a:t>drastically limited </a:t>
+            </a:r>
+            <a:r>
+              <a:rPr lang="en-US" sz="1700" dirty="0"/>
+              <a:t>today.</a:t>
+            </a:r>
+          </a:p>
+          <a:p>
+            <a:pPr marL="285750" indent="-285750">
+              <a:spcBef>
+                <a:spcPts val="300"/>
+              </a:spcBef>
+              <a:spcAft>
+                <a:spcPts val="300"/>
+              </a:spcAft>
+              <a:buFont typeface="Arial" panose="020B0604020202020204" pitchFamily="34" charset="0"/>
+              <a:buChar char="•"/>
+            </a:pPr>
+            <a:r>
               <a:rPr lang="en-US" sz="1700" dirty="0"/>
               <a:t>draft-</a:t>
             </a:r>
@@ -5443,15 +5487,7 @@
             </a:r>
             <a:r>
               <a:rPr lang="en-US" sz="1700" dirty="0"/>
-              <a:t>-telemetry not only </a:t>
-            </a:r>
-            <a:r>
-              <a:rPr lang="en-US" sz="1700" b="1" dirty="0"/>
-              <a:t>addresses this two impediments</a:t>
-            </a:r>
-            <a:r>
-              <a:rPr lang="en-US" sz="1700" dirty="0"/>
-              <a:t>, but also </a:t>
+              <a:t>-telemetry enables IPFIX to export delay while preserving the ability to aggregate and also </a:t>
             </a:r>
             <a:r>
               <a:rPr lang="en-US" sz="1700" b="1" dirty="0"/>
@@ -5682,7 +5718,7 @@
             </a:r>
             <a:r>
               <a:rPr lang="en-US" sz="1700" b="1" dirty="0"/>
-              <a:t>which customer</a:t>
+              <a:t>which service</a:t>
             </a:r>
             <a:r>
               <a:rPr lang="en-US" sz="1700" dirty="0"/>
@@ -6510,7 +6546,7 @@
         <p:spPr>
           <a:xfrm>
             <a:off x="838199" y="1884420"/>
-            <a:ext cx="7782099" cy="4292543"/>
+            <a:ext cx="8208819" cy="4292543"/>
           </a:xfrm>
         </p:spPr>
         <p:txBody>
@@ -6560,7 +6596,13 @@
           <a:p>
             <a:r>
               <a:rPr lang="en-US" sz="2000" dirty="0"/>
-              <a:t>Huawei validated technical feasibility and working on an implementation. Cisco is currently validating technical feasibility. Other network vendors showing interest.</a:t>
+              <a:t>IEs in document defined are independent from how the delay is being metered.</a:t>
+            </a:r>
+          </a:p>
+          <a:p>
+            <a:r>
+              <a:rPr lang="en-US" sz="2000" dirty="0"/>
+              <a:t>Two vendors are validating on technical feasibility. Others showing interest.</a:t>
             </a:r>
           </a:p>
           <a:p>
@@ -6643,8 +6685,8 @@
         </p:blipFill>
         <p:spPr>
           <a:xfrm>
-            <a:off x="8885551" y="666605"/>
-            <a:ext cx="3116592" cy="4292543"/>
+            <a:off x="9045343" y="886691"/>
+            <a:ext cx="2956799" cy="4072457"/>
           </a:xfrm>
           <a:prstGeom prst="rect">
             <a:avLst/>

</xml_diff>

<commit_message>
Added intro Slide with state of the union at Swisscom
</commit_message>
<xml_diff>
--- a/draft-tgraf-opsawg-ipfix-inband-telemetry-00.pptx
+++ b/draft-tgraf-opsawg-ipfix-inband-telemetry-00.pptx
@@ -5,15 +5,16 @@
     <p:sldMasterId id="2147483648" r:id="rId1"/>
   </p:sldMasterIdLst>
   <p:notesMasterIdLst>
-    <p:notesMasterId r:id="rId8"/>
+    <p:notesMasterId r:id="rId9"/>
   </p:notesMasterIdLst>
   <p:sldIdLst>
     <p:sldId id="1041" r:id="rId2"/>
     <p:sldId id="26411" r:id="rId3"/>
-    <p:sldId id="817" r:id="rId4"/>
-    <p:sldId id="1053" r:id="rId5"/>
-    <p:sldId id="26412" r:id="rId6"/>
-    <p:sldId id="26413" r:id="rId7"/>
+    <p:sldId id="26414" r:id="rId4"/>
+    <p:sldId id="817" r:id="rId5"/>
+    <p:sldId id="1053" r:id="rId6"/>
+    <p:sldId id="26412" r:id="rId7"/>
+    <p:sldId id="26413" r:id="rId8"/>
   </p:sldIdLst>
   <p:sldSz cx="12192000" cy="6858000"/>
   <p:notesSz cx="6858000" cy="9144000"/>
@@ -1279,6 +1280,90 @@
 </p:notes>
 </file>
 
+<file path=ppt/notesSlides/notesSlide2.xml><?xml version="1.0" encoding="utf-8"?>
+<p:notes xmlns:a="http://schemas.openxmlformats.org/drawingml/2006/main" xmlns:r="http://schemas.openxmlformats.org/officeDocument/2006/relationships" xmlns:p="http://schemas.openxmlformats.org/presentationml/2006/main">
+  <p:cSld>
+    <p:spTree>
+      <p:nvGrpSpPr>
+        <p:cNvPr id="1" name=""/>
+        <p:cNvGrpSpPr/>
+        <p:nvPr/>
+      </p:nvGrpSpPr>
+      <p:grpSpPr>
+        <a:xfrm>
+          <a:off x="0" y="0"/>
+          <a:ext cx="0" cy="0"/>
+          <a:chOff x="0" y="0"/>
+          <a:chExt cx="0" cy="0"/>
+        </a:xfrm>
+      </p:grpSpPr>
+      <p:sp>
+        <p:nvSpPr>
+          <p:cNvPr id="2" name="Slide Image Placeholder 1"/>
+          <p:cNvSpPr>
+            <a:spLocks noGrp="1" noRot="1" noChangeAspect="1"/>
+          </p:cNvSpPr>
+          <p:nvPr>
+            <p:ph type="sldImg"/>
+          </p:nvPr>
+        </p:nvSpPr>
+        <p:spPr/>
+      </p:sp>
+      <p:sp>
+        <p:nvSpPr>
+          <p:cNvPr id="3" name="Notes Placeholder 2"/>
+          <p:cNvSpPr>
+            <a:spLocks noGrp="1"/>
+          </p:cNvSpPr>
+          <p:nvPr>
+            <p:ph type="body" idx="1"/>
+          </p:nvPr>
+        </p:nvSpPr>
+        <p:spPr/>
+        <p:txBody>
+          <a:bodyPr/>
+          <a:lstStyle/>
+          <a:p>
+            <a:endParaRPr lang="de-CH" dirty="0"/>
+          </a:p>
+        </p:txBody>
+      </p:sp>
+      <p:sp>
+        <p:nvSpPr>
+          <p:cNvPr id="4" name="Slide Number Placeholder 3"/>
+          <p:cNvSpPr>
+            <a:spLocks noGrp="1"/>
+          </p:cNvSpPr>
+          <p:nvPr>
+            <p:ph type="sldNum" sz="quarter" idx="5"/>
+          </p:nvPr>
+        </p:nvSpPr>
+        <p:spPr/>
+        <p:txBody>
+          <a:bodyPr/>
+          <a:lstStyle/>
+          <a:p>
+            <a:fld id="{3CB1C083-703C-451B-9F49-71D74F7A8ADE}" type="slidenum">
+              <a:rPr lang="de-CH" smtClean="0"/>
+              <a:t>3</a:t>
+            </a:fld>
+            <a:endParaRPr lang="de-CH"/>
+          </a:p>
+        </p:txBody>
+      </p:sp>
+    </p:spTree>
+    <p:extLst>
+      <p:ext uri="{BB962C8B-B14F-4D97-AF65-F5344CB8AC3E}">
+        <p14:creationId xmlns:p14="http://schemas.microsoft.com/office/powerpoint/2010/main" val="3674708366"/>
+      </p:ext>
+    </p:extLst>
+  </p:cSld>
+  <p:clrMapOvr>
+    <a:masterClrMapping/>
+  </p:clrMapOvr>
+</p:notes>
+</file>
+
 <file path=ppt/slideLayouts/slideLayout1.xml><?xml version="1.0" encoding="utf-8"?>
 <p:sldLayout xmlns:a="http://schemas.openxmlformats.org/drawingml/2006/main" xmlns:r="http://schemas.openxmlformats.org/officeDocument/2006/relationships" xmlns:p="http://schemas.openxmlformats.org/presentationml/2006/main" type="title" preserve="1">
   <p:cSld name="Title Slide">
@@ -5219,13 +5304,13 @@
         </p:nvSpPr>
         <p:spPr>
           <a:xfrm>
-            <a:off x="6278253" y="1690688"/>
-            <a:ext cx="5684362" cy="4917502"/>
+            <a:off x="830006" y="2253006"/>
+            <a:ext cx="4561724" cy="3996389"/>
           </a:xfrm>
         </p:spPr>
         <p:txBody>
           <a:bodyPr>
-            <a:normAutofit lnSpcReduction="10000"/>
+            <a:normAutofit/>
           </a:bodyPr>
           <a:lstStyle/>
           <a:p>
@@ -5238,28 +5323,16 @@
               </a:spcAft>
             </a:pPr>
             <a:r>
-              <a:rPr lang="en-US" sz="1700" dirty="0"/>
-              <a:t>IPFIX defines two key data engineering tools to reduce collected and exported amount of data. </a:t>
-            </a:r>
-            <a:r>
-              <a:rPr lang="en-US" sz="1700" b="1" dirty="0"/>
-              <a:t>Sampling and Aggregation. </a:t>
-            </a:r>
-            <a:r>
-              <a:rPr lang="en-US" sz="1700" dirty="0"/>
-              <a:t>Enabling </a:t>
-            </a:r>
-            <a:r>
-              <a:rPr lang="en-US" sz="1700" b="1" dirty="0"/>
-              <a:t>a statistical view from the network usage. </a:t>
-            </a:r>
-            <a:r>
-              <a:rPr lang="en-US" sz="1700" dirty="0"/>
-              <a:t>Also called </a:t>
-            </a:r>
-            <a:r>
-              <a:rPr lang="en-US" sz="1700" b="1" dirty="0"/>
-              <a:t>connectivity matrix.</a:t>
+              <a:rPr lang="en-US" sz="2200" dirty="0"/>
+              <a:t>Increasing coverage from </a:t>
+            </a:r>
+            <a:r>
+              <a:rPr lang="en-US" sz="2200" b="1" dirty="0"/>
+              <a:t>3000 nodes today </a:t>
+            </a:r>
+            <a:r>
+              <a:rPr lang="en-US" sz="2200" dirty="0"/>
+              <a:t>to 10'000 by end of 2022. Covering MPLS-SR P, PE to CE.</a:t>
             </a:r>
           </a:p>
           <a:p>
@@ -5272,76 +5345,16 @@
               </a:spcAft>
             </a:pPr>
             <a:r>
-              <a:rPr lang="en-US" sz="1700" dirty="0"/>
-              <a:t>IPFIX </a:t>
-            </a:r>
-            <a:r>
-              <a:rPr lang="en-US" sz="1700" b="1" dirty="0"/>
-              <a:t>measures packets and bytes </a:t>
-            </a:r>
-            <a:r>
-              <a:rPr lang="en-US" sz="1700" dirty="0"/>
-              <a:t>and give </a:t>
-            </a:r>
-            <a:r>
-              <a:rPr lang="en-US" sz="1700" b="1" dirty="0"/>
-              <a:t>device and control-plane context</a:t>
-            </a:r>
-            <a:r>
-              <a:rPr lang="en-US" sz="1700" dirty="0"/>
-              <a:t>. </a:t>
-            </a:r>
-          </a:p>
-          <a:p>
-            <a:pPr marL="285750" indent="-285750">
-              <a:spcBef>
-                <a:spcPts val="300"/>
-              </a:spcBef>
-              <a:spcAft>
-                <a:spcPts val="300"/>
-              </a:spcAft>
-              <a:buFont typeface="Arial" panose="020B0604020202020204" pitchFamily="34" charset="0"/>
-              <a:buChar char="•"/>
-            </a:pPr>
-            <a:r>
-              <a:rPr lang="en-US" sz="1700" b="1" dirty="0"/>
-              <a:t>With </a:t>
-            </a:r>
-            <a:r>
-              <a:rPr lang="en-US" sz="1700" b="1" dirty="0" err="1"/>
-              <a:t>Inband</a:t>
-            </a:r>
-            <a:r>
-              <a:rPr lang="en-US" sz="1700" b="1" dirty="0"/>
-              <a:t> Telemetry</a:t>
-            </a:r>
-            <a:r>
-              <a:rPr lang="en-US" sz="1700" dirty="0"/>
-              <a:t>, </a:t>
-            </a:r>
-            <a:r>
-              <a:rPr lang="en-US" sz="1700" dirty="0" err="1"/>
-              <a:t>iOAM</a:t>
-            </a:r>
-            <a:r>
-              <a:rPr lang="en-US" sz="1700" dirty="0"/>
-              <a:t>, Path Tracing and </a:t>
-            </a:r>
-            <a:r>
-              <a:rPr lang="en-US" sz="1700" dirty="0" err="1"/>
-              <a:t>iFIT</a:t>
-            </a:r>
-            <a:r>
-              <a:rPr lang="en-US" sz="1700" dirty="0"/>
-              <a:t>, </a:t>
-            </a:r>
-            <a:r>
-              <a:rPr lang="en-US" sz="1700" b="1" dirty="0"/>
-              <a:t>delay can be measured </a:t>
-            </a:r>
-            <a:r>
-              <a:rPr lang="en-US" sz="1700" dirty="0"/>
-              <a:t>actively (probing) or passively. Metrics are exposed on every node, postcards or only at the last node (passport).</a:t>
+              <a:rPr lang="en-US" sz="2200" dirty="0"/>
+              <a:t>Collecting and Aggregating </a:t>
+            </a:r>
+            <a:r>
+              <a:rPr lang="en-US" sz="2200" b="1" dirty="0"/>
+              <a:t>100'000 IPFIX Packets per second</a:t>
+            </a:r>
+            <a:r>
+              <a:rPr lang="en-US" sz="2200" dirty="0"/>
+              <a:t>.</a:t>
             </a:r>
           </a:p>
           <a:p>
@@ -5354,60 +5367,16 @@
               </a:spcAft>
             </a:pPr>
             <a:r>
-              <a:rPr lang="de-CH" sz="1700" b="1" dirty="0"/>
-              <a:t>IPFIX </a:t>
-            </a:r>
-            <a:r>
-              <a:rPr lang="de-CH" sz="1700" b="1" dirty="0" err="1"/>
-              <a:t>lacks</a:t>
-            </a:r>
-            <a:r>
-              <a:rPr lang="de-CH" sz="1700" b="1" dirty="0"/>
-              <a:t> </a:t>
-            </a:r>
-            <a:r>
-              <a:rPr lang="de-CH" sz="1700" b="1" dirty="0" err="1"/>
-              <a:t>the</a:t>
-            </a:r>
-            <a:r>
-              <a:rPr lang="de-CH" sz="1700" b="1" dirty="0"/>
-              <a:t> </a:t>
-            </a:r>
-            <a:r>
-              <a:rPr lang="de-CH" sz="1700" b="1" dirty="0" err="1"/>
-              <a:t>ability</a:t>
-            </a:r>
-            <a:r>
-              <a:rPr lang="de-CH" sz="1700" b="1" dirty="0"/>
-              <a:t> </a:t>
-            </a:r>
-            <a:r>
-              <a:rPr lang="de-CH" sz="1700" b="1" dirty="0" err="1"/>
-              <a:t>to</a:t>
-            </a:r>
-            <a:r>
-              <a:rPr lang="de-CH" sz="1700" b="1" dirty="0"/>
-              <a:t> </a:t>
-            </a:r>
-            <a:r>
-              <a:rPr lang="de-CH" sz="1700" b="1" dirty="0" err="1"/>
-              <a:t>export</a:t>
-            </a:r>
-            <a:r>
-              <a:rPr lang="de-CH" sz="1700" b="1" dirty="0"/>
-              <a:t> </a:t>
-            </a:r>
-            <a:r>
-              <a:rPr lang="de-CH" sz="1700" b="1" dirty="0" err="1"/>
-              <a:t>delay</a:t>
-            </a:r>
-            <a:r>
-              <a:rPr lang="en-US" sz="1700" b="1" dirty="0"/>
-              <a:t>. </a:t>
-            </a:r>
-            <a:r>
-              <a:rPr lang="en-US" sz="1700" dirty="0"/>
-              <a:t>A key element for monitoring Customer Service Level Agreements.</a:t>
+              <a:rPr lang="en-US" sz="2200" dirty="0"/>
+              <a:t>Producing </a:t>
+            </a:r>
+            <a:r>
+              <a:rPr lang="en-US" sz="2200" b="1" dirty="0"/>
+              <a:t>700'000 Apache Kafka messages with 20'000'000 metrics per second</a:t>
+            </a:r>
+            <a:r>
+              <a:rPr lang="en-US" sz="2200" dirty="0"/>
+              <a:t>.</a:t>
             </a:r>
           </a:p>
           <a:p>
@@ -5418,36 +5387,14 @@
               <a:spcAft>
                 <a:spcPts val="300"/>
               </a:spcAft>
-              <a:buFont typeface="Arial" panose="020B0604020202020204" pitchFamily="34" charset="0"/>
-              <a:buChar char="•"/>
             </a:pPr>
             <a:r>
-              <a:rPr lang="en-US" sz="1700" b="1" dirty="0" err="1"/>
-              <a:t>Inband</a:t>
-            </a:r>
-            <a:r>
-              <a:rPr lang="en-US" sz="1700" b="1" dirty="0"/>
-              <a:t> Telemetry lacks Flow Aggregation support </a:t>
-            </a:r>
-            <a:r>
-              <a:rPr lang="en-US" sz="1700" dirty="0"/>
-              <a:t>as defined in RFC 7015. Therefore, </a:t>
-            </a:r>
-            <a:r>
-              <a:rPr lang="en-US" sz="1700" b="1" dirty="0"/>
-              <a:t>scalability</a:t>
-            </a:r>
-            <a:r>
-              <a:rPr lang="en-US" sz="1700" dirty="0"/>
-              <a:t> in terms of data export and collection is </a:t>
-            </a:r>
-            <a:r>
-              <a:rPr lang="en-US" sz="1700" b="1" dirty="0"/>
-              <a:t>drastically limited </a:t>
-            </a:r>
-            <a:r>
-              <a:rPr lang="en-US" sz="1700" dirty="0"/>
-              <a:t>today.</a:t>
+              <a:rPr lang="en-US" sz="2200" b="1" dirty="0"/>
+              <a:t>Being used by 300 engineers every day</a:t>
+            </a:r>
+            <a:r>
+              <a:rPr lang="en-US" sz="2200" dirty="0"/>
+              <a:t> to verify network maintenance windows and troubleshoot customer incidents.</a:t>
             </a:r>
           </a:p>
           <a:p>
@@ -5458,86 +5405,11 @@
               <a:spcAft>
                 <a:spcPts val="300"/>
               </a:spcAft>
-              <a:buFont typeface="Arial" panose="020B0604020202020204" pitchFamily="34" charset="0"/>
-              <a:buChar char="•"/>
             </a:pPr>
-            <a:r>
-              <a:rPr lang="en-US" sz="1700" dirty="0"/>
-              <a:t>draft-</a:t>
-            </a:r>
-            <a:r>
-              <a:rPr lang="en-US" sz="1700" dirty="0" err="1"/>
-              <a:t>tgraf</a:t>
-            </a:r>
-            <a:r>
-              <a:rPr lang="en-US" sz="1700" dirty="0"/>
-              <a:t>-opsawg-</a:t>
-            </a:r>
-            <a:r>
-              <a:rPr lang="en-US" sz="1700" dirty="0" err="1"/>
-              <a:t>ipfix</a:t>
-            </a:r>
-            <a:r>
-              <a:rPr lang="en-US" sz="1700" dirty="0"/>
-              <a:t>-</a:t>
-            </a:r>
-            <a:r>
-              <a:rPr lang="en-US" sz="1700" dirty="0" err="1"/>
-              <a:t>inband</a:t>
-            </a:r>
-            <a:r>
-              <a:rPr lang="en-US" sz="1700" dirty="0"/>
-              <a:t>-telemetry enables IPFIX to export delay while preserving the ability to aggregate and also </a:t>
-            </a:r>
-            <a:r>
-              <a:rPr lang="en-US" sz="1700" b="1" dirty="0"/>
-              <a:t>adds the </a:t>
-            </a:r>
-            <a:r>
-              <a:rPr lang="en-US" sz="1700" b="1" dirty="0" err="1"/>
-              <a:t>Inband</a:t>
-            </a:r>
-            <a:r>
-              <a:rPr lang="en-US" sz="1700" b="1" dirty="0"/>
-              <a:t> Telemetry path delay metric definition</a:t>
-            </a:r>
-            <a:r>
-              <a:rPr lang="en-US" sz="1700" dirty="0"/>
-              <a:t> in the performance registry for proper delay definition.</a:t>
-            </a:r>
-          </a:p>
-        </p:txBody>
-      </p:sp>
-      <p:pic>
-        <p:nvPicPr>
-          <p:cNvPr id="5" name="Picture 4">
-            <a:extLst>
-              <a:ext uri="{FF2B5EF4-FFF2-40B4-BE49-F238E27FC236}">
-                <a16:creationId xmlns:a16="http://schemas.microsoft.com/office/drawing/2014/main" id="{17C555EC-7097-40D7-9353-664AF0ED39D5}"/>
-              </a:ext>
-            </a:extLst>
-          </p:cNvPr>
-          <p:cNvPicPr>
-            <a:picLocks noChangeAspect="1"/>
-          </p:cNvPicPr>
-          <p:nvPr/>
-        </p:nvPicPr>
-        <p:blipFill>
-          <a:blip r:embed="rId3"/>
-          <a:stretch>
-            <a:fillRect/>
-          </a:stretch>
-        </p:blipFill>
-        <p:spPr>
-          <a:xfrm>
-            <a:off x="1199456" y="1805062"/>
-            <a:ext cx="4552951" cy="4720282"/>
-          </a:xfrm>
-          <a:prstGeom prst="rect">
-            <a:avLst/>
-          </a:prstGeom>
-        </p:spPr>
-      </p:pic>
+            <a:endParaRPr lang="en-US" sz="2200" b="1" dirty="0"/>
+          </a:p>
+        </p:txBody>
+      </p:sp>
       <p:sp>
         <p:nvSpPr>
           <p:cNvPr id="8" name="Title 1">
@@ -5586,12 +5458,8 @@
           </a:lstStyle>
           <a:p>
             <a:r>
-              <a:rPr lang="en-US" sz="3100" b="1" dirty="0" err="1"/>
-              <a:t>Inband</a:t>
-            </a:r>
-            <a:r>
               <a:rPr lang="en-US" sz="3100" b="1" dirty="0"/>
-              <a:t> Telemetry with IPFIX Flow-Aggregation</a:t>
+              <a:t>IPFIX – State of the Union at Swisscom</a:t>
             </a:r>
             <a:br>
               <a:rPr lang="en-GB" sz="2800" dirty="0"/>
@@ -5604,7 +5472,7 @@
                   </a:schemeClr>
                 </a:solidFill>
               </a:rPr>
-              <a:t>Aggregate and sample as early as possible – Chose your Cardinality</a:t>
+              <a:t>Proven value and scale since 2015</a:t>
             </a:r>
             <a:endParaRPr lang="en-US" sz="2700" dirty="0">
               <a:solidFill>
@@ -5613,6 +5481,2142 @@
                 </a:schemeClr>
               </a:solidFill>
             </a:endParaRPr>
+          </a:p>
+        </p:txBody>
+      </p:sp>
+      <p:sp>
+        <p:nvSpPr>
+          <p:cNvPr id="6" name="Freeform: Shape 5">
+            <a:extLst>
+              <a:ext uri="{FF2B5EF4-FFF2-40B4-BE49-F238E27FC236}">
+                <a16:creationId xmlns:a16="http://schemas.microsoft.com/office/drawing/2014/main" id="{3EC9468E-3AFF-4530-8B60-D1EE450E3E03}"/>
+              </a:ext>
+            </a:extLst>
+          </p:cNvPr>
+          <p:cNvSpPr/>
+          <p:nvPr/>
+        </p:nvSpPr>
+        <p:spPr bwMode="gray">
+          <a:xfrm>
+            <a:off x="7533261" y="3456259"/>
+            <a:ext cx="4378036" cy="1888342"/>
+          </a:xfrm>
+          <a:custGeom>
+            <a:avLst/>
+            <a:gdLst>
+              <a:gd name="connsiteX0" fmla="*/ 0 w 4655127"/>
+              <a:gd name="connsiteY0" fmla="*/ 1589193 h 2010346"/>
+              <a:gd name="connsiteX1" fmla="*/ 794327 w 4655127"/>
+              <a:gd name="connsiteY1" fmla="*/ 1663084 h 2010346"/>
+              <a:gd name="connsiteX2" fmla="*/ 2235200 w 4655127"/>
+              <a:gd name="connsiteY2" fmla="*/ 539 h 2010346"/>
+              <a:gd name="connsiteX3" fmla="*/ 3740727 w 4655127"/>
+              <a:gd name="connsiteY3" fmla="*/ 1857048 h 2010346"/>
+              <a:gd name="connsiteX4" fmla="*/ 4655127 w 4655127"/>
+              <a:gd name="connsiteY4" fmla="*/ 1884757 h 2010346"/>
+              <a:gd name="connsiteX0" fmla="*/ 0 w 4655127"/>
+              <a:gd name="connsiteY0" fmla="*/ 1588735 h 1937418"/>
+              <a:gd name="connsiteX1" fmla="*/ 794327 w 4655127"/>
+              <a:gd name="connsiteY1" fmla="*/ 1662626 h 1937418"/>
+              <a:gd name="connsiteX2" fmla="*/ 2235200 w 4655127"/>
+              <a:gd name="connsiteY2" fmla="*/ 81 h 1937418"/>
+              <a:gd name="connsiteX3" fmla="*/ 3639127 w 4655127"/>
+              <a:gd name="connsiteY3" fmla="*/ 1736517 h 1937418"/>
+              <a:gd name="connsiteX4" fmla="*/ 4655127 w 4655127"/>
+              <a:gd name="connsiteY4" fmla="*/ 1884299 h 1937418"/>
+              <a:gd name="connsiteX0" fmla="*/ 0 w 4645890"/>
+              <a:gd name="connsiteY0" fmla="*/ 1588735 h 1900131"/>
+              <a:gd name="connsiteX1" fmla="*/ 794327 w 4645890"/>
+              <a:gd name="connsiteY1" fmla="*/ 1662626 h 1900131"/>
+              <a:gd name="connsiteX2" fmla="*/ 2235200 w 4645890"/>
+              <a:gd name="connsiteY2" fmla="*/ 81 h 1900131"/>
+              <a:gd name="connsiteX3" fmla="*/ 3639127 w 4645890"/>
+              <a:gd name="connsiteY3" fmla="*/ 1736517 h 1900131"/>
+              <a:gd name="connsiteX4" fmla="*/ 4645890 w 4645890"/>
+              <a:gd name="connsiteY4" fmla="*/ 1810408 h 1900131"/>
+              <a:gd name="connsiteX0" fmla="*/ 0 w 4645890"/>
+              <a:gd name="connsiteY0" fmla="*/ 1588676 h 1843012"/>
+              <a:gd name="connsiteX1" fmla="*/ 794327 w 4645890"/>
+              <a:gd name="connsiteY1" fmla="*/ 1662567 h 1843012"/>
+              <a:gd name="connsiteX2" fmla="*/ 2235200 w 4645890"/>
+              <a:gd name="connsiteY2" fmla="*/ 22 h 1843012"/>
+              <a:gd name="connsiteX3" fmla="*/ 3546764 w 4645890"/>
+              <a:gd name="connsiteY3" fmla="*/ 1625621 h 1843012"/>
+              <a:gd name="connsiteX4" fmla="*/ 4645890 w 4645890"/>
+              <a:gd name="connsiteY4" fmla="*/ 1810349 h 1843012"/>
+              <a:gd name="connsiteX0" fmla="*/ 0 w 4645890"/>
+              <a:gd name="connsiteY0" fmla="*/ 1588660 h 1850511"/>
+              <a:gd name="connsiteX1" fmla="*/ 794327 w 4645890"/>
+              <a:gd name="connsiteY1" fmla="*/ 1662551 h 1850511"/>
+              <a:gd name="connsiteX2" fmla="*/ 2235200 w 4645890"/>
+              <a:gd name="connsiteY2" fmla="*/ 6 h 1850511"/>
+              <a:gd name="connsiteX3" fmla="*/ 3546764 w 4645890"/>
+              <a:gd name="connsiteY3" fmla="*/ 1644077 h 1850511"/>
+              <a:gd name="connsiteX4" fmla="*/ 4645890 w 4645890"/>
+              <a:gd name="connsiteY4" fmla="*/ 1810333 h 1850511"/>
+              <a:gd name="connsiteX0" fmla="*/ 0 w 4645890"/>
+              <a:gd name="connsiteY0" fmla="*/ 1588660 h 1856372"/>
+              <a:gd name="connsiteX1" fmla="*/ 794327 w 4645890"/>
+              <a:gd name="connsiteY1" fmla="*/ 1662551 h 1856372"/>
+              <a:gd name="connsiteX2" fmla="*/ 2235200 w 4645890"/>
+              <a:gd name="connsiteY2" fmla="*/ 6 h 1856372"/>
+              <a:gd name="connsiteX3" fmla="*/ 3546764 w 4645890"/>
+              <a:gd name="connsiteY3" fmla="*/ 1644077 h 1856372"/>
+              <a:gd name="connsiteX4" fmla="*/ 4645890 w 4645890"/>
+              <a:gd name="connsiteY4" fmla="*/ 1819570 h 1856372"/>
+              <a:gd name="connsiteX0" fmla="*/ 0 w 4645890"/>
+              <a:gd name="connsiteY0" fmla="*/ 1588701 h 1856413"/>
+              <a:gd name="connsiteX1" fmla="*/ 794327 w 4645890"/>
+              <a:gd name="connsiteY1" fmla="*/ 1699538 h 1856413"/>
+              <a:gd name="connsiteX2" fmla="*/ 2235200 w 4645890"/>
+              <a:gd name="connsiteY2" fmla="*/ 47 h 1856413"/>
+              <a:gd name="connsiteX3" fmla="*/ 3546764 w 4645890"/>
+              <a:gd name="connsiteY3" fmla="*/ 1644118 h 1856413"/>
+              <a:gd name="connsiteX4" fmla="*/ 4645890 w 4645890"/>
+              <a:gd name="connsiteY4" fmla="*/ 1819611 h 1856413"/>
+              <a:gd name="connsiteX0" fmla="*/ 0 w 4729017"/>
+              <a:gd name="connsiteY0" fmla="*/ 1625646 h 1856413"/>
+              <a:gd name="connsiteX1" fmla="*/ 877454 w 4729017"/>
+              <a:gd name="connsiteY1" fmla="*/ 1699538 h 1856413"/>
+              <a:gd name="connsiteX2" fmla="*/ 2318327 w 4729017"/>
+              <a:gd name="connsiteY2" fmla="*/ 47 h 1856413"/>
+              <a:gd name="connsiteX3" fmla="*/ 3629891 w 4729017"/>
+              <a:gd name="connsiteY3" fmla="*/ 1644118 h 1856413"/>
+              <a:gd name="connsiteX4" fmla="*/ 4729017 w 4729017"/>
+              <a:gd name="connsiteY4" fmla="*/ 1819611 h 1856413"/>
+              <a:gd name="connsiteX0" fmla="*/ 0 w 4729017"/>
+              <a:gd name="connsiteY0" fmla="*/ 1625646 h 1856413"/>
+              <a:gd name="connsiteX1" fmla="*/ 877454 w 4729017"/>
+              <a:gd name="connsiteY1" fmla="*/ 1699538 h 1856413"/>
+              <a:gd name="connsiteX2" fmla="*/ 2318327 w 4729017"/>
+              <a:gd name="connsiteY2" fmla="*/ 47 h 1856413"/>
+              <a:gd name="connsiteX3" fmla="*/ 3629891 w 4729017"/>
+              <a:gd name="connsiteY3" fmla="*/ 1644118 h 1856413"/>
+              <a:gd name="connsiteX4" fmla="*/ 4729017 w 4729017"/>
+              <a:gd name="connsiteY4" fmla="*/ 1819611 h 1856413"/>
+              <a:gd name="connsiteX0" fmla="*/ 0 w 4747490"/>
+              <a:gd name="connsiteY0" fmla="*/ 1754955 h 1856413"/>
+              <a:gd name="connsiteX1" fmla="*/ 895927 w 4747490"/>
+              <a:gd name="connsiteY1" fmla="*/ 1699538 h 1856413"/>
+              <a:gd name="connsiteX2" fmla="*/ 2336800 w 4747490"/>
+              <a:gd name="connsiteY2" fmla="*/ 47 h 1856413"/>
+              <a:gd name="connsiteX3" fmla="*/ 3648364 w 4747490"/>
+              <a:gd name="connsiteY3" fmla="*/ 1644118 h 1856413"/>
+              <a:gd name="connsiteX4" fmla="*/ 4747490 w 4747490"/>
+              <a:gd name="connsiteY4" fmla="*/ 1819611 h 1856413"/>
+              <a:gd name="connsiteX0" fmla="*/ 0 w 4747490"/>
+              <a:gd name="connsiteY0" fmla="*/ 1754955 h 1856413"/>
+              <a:gd name="connsiteX1" fmla="*/ 895927 w 4747490"/>
+              <a:gd name="connsiteY1" fmla="*/ 1699538 h 1856413"/>
+              <a:gd name="connsiteX2" fmla="*/ 2336800 w 4747490"/>
+              <a:gd name="connsiteY2" fmla="*/ 47 h 1856413"/>
+              <a:gd name="connsiteX3" fmla="*/ 3648364 w 4747490"/>
+              <a:gd name="connsiteY3" fmla="*/ 1644118 h 1856413"/>
+              <a:gd name="connsiteX4" fmla="*/ 4747490 w 4747490"/>
+              <a:gd name="connsiteY4" fmla="*/ 1819611 h 1856413"/>
+              <a:gd name="connsiteX0" fmla="*/ 0 w 4738254"/>
+              <a:gd name="connsiteY0" fmla="*/ 1801137 h 1856413"/>
+              <a:gd name="connsiteX1" fmla="*/ 886691 w 4738254"/>
+              <a:gd name="connsiteY1" fmla="*/ 1699538 h 1856413"/>
+              <a:gd name="connsiteX2" fmla="*/ 2327564 w 4738254"/>
+              <a:gd name="connsiteY2" fmla="*/ 47 h 1856413"/>
+              <a:gd name="connsiteX3" fmla="*/ 3639128 w 4738254"/>
+              <a:gd name="connsiteY3" fmla="*/ 1644118 h 1856413"/>
+              <a:gd name="connsiteX4" fmla="*/ 4738254 w 4738254"/>
+              <a:gd name="connsiteY4" fmla="*/ 1819611 h 1856413"/>
+              <a:gd name="connsiteX0" fmla="*/ 0 w 4738254"/>
+              <a:gd name="connsiteY0" fmla="*/ 1801137 h 1860762"/>
+              <a:gd name="connsiteX1" fmla="*/ 886691 w 4738254"/>
+              <a:gd name="connsiteY1" fmla="*/ 1699538 h 1860762"/>
+              <a:gd name="connsiteX2" fmla="*/ 2327564 w 4738254"/>
+              <a:gd name="connsiteY2" fmla="*/ 47 h 1860762"/>
+              <a:gd name="connsiteX3" fmla="*/ 3639128 w 4738254"/>
+              <a:gd name="connsiteY3" fmla="*/ 1644118 h 1860762"/>
+              <a:gd name="connsiteX4" fmla="*/ 4738254 w 4738254"/>
+              <a:gd name="connsiteY4" fmla="*/ 1819611 h 1860762"/>
+              <a:gd name="connsiteX0" fmla="*/ 0 w 4719782"/>
+              <a:gd name="connsiteY0" fmla="*/ 1828846 h 1873858"/>
+              <a:gd name="connsiteX1" fmla="*/ 868219 w 4719782"/>
+              <a:gd name="connsiteY1" fmla="*/ 1699538 h 1873858"/>
+              <a:gd name="connsiteX2" fmla="*/ 2309092 w 4719782"/>
+              <a:gd name="connsiteY2" fmla="*/ 47 h 1873858"/>
+              <a:gd name="connsiteX3" fmla="*/ 3620656 w 4719782"/>
+              <a:gd name="connsiteY3" fmla="*/ 1644118 h 1873858"/>
+              <a:gd name="connsiteX4" fmla="*/ 4719782 w 4719782"/>
+              <a:gd name="connsiteY4" fmla="*/ 1819611 h 1873858"/>
+              <a:gd name="connsiteX0" fmla="*/ 0 w 4719782"/>
+              <a:gd name="connsiteY0" fmla="*/ 1828846 h 1859118"/>
+              <a:gd name="connsiteX1" fmla="*/ 868219 w 4719782"/>
+              <a:gd name="connsiteY1" fmla="*/ 1699538 h 1859118"/>
+              <a:gd name="connsiteX2" fmla="*/ 2309092 w 4719782"/>
+              <a:gd name="connsiteY2" fmla="*/ 47 h 1859118"/>
+              <a:gd name="connsiteX3" fmla="*/ 3620656 w 4719782"/>
+              <a:gd name="connsiteY3" fmla="*/ 1644118 h 1859118"/>
+              <a:gd name="connsiteX4" fmla="*/ 4719782 w 4719782"/>
+              <a:gd name="connsiteY4" fmla="*/ 1819611 h 1859118"/>
+              <a:gd name="connsiteX0" fmla="*/ 0 w 4756727"/>
+              <a:gd name="connsiteY0" fmla="*/ 1856555 h 1872094"/>
+              <a:gd name="connsiteX1" fmla="*/ 905164 w 4756727"/>
+              <a:gd name="connsiteY1" fmla="*/ 1699538 h 1872094"/>
+              <a:gd name="connsiteX2" fmla="*/ 2346037 w 4756727"/>
+              <a:gd name="connsiteY2" fmla="*/ 47 h 1872094"/>
+              <a:gd name="connsiteX3" fmla="*/ 3657601 w 4756727"/>
+              <a:gd name="connsiteY3" fmla="*/ 1644118 h 1872094"/>
+              <a:gd name="connsiteX4" fmla="*/ 4756727 w 4756727"/>
+              <a:gd name="connsiteY4" fmla="*/ 1819611 h 1872094"/>
+              <a:gd name="connsiteX0" fmla="*/ 0 w 4756727"/>
+              <a:gd name="connsiteY0" fmla="*/ 1856555 h 1888342"/>
+              <a:gd name="connsiteX1" fmla="*/ 905164 w 4756727"/>
+              <a:gd name="connsiteY1" fmla="*/ 1699538 h 1888342"/>
+              <a:gd name="connsiteX2" fmla="*/ 2346037 w 4756727"/>
+              <a:gd name="connsiteY2" fmla="*/ 47 h 1888342"/>
+              <a:gd name="connsiteX3" fmla="*/ 3657601 w 4756727"/>
+              <a:gd name="connsiteY3" fmla="*/ 1644118 h 1888342"/>
+              <a:gd name="connsiteX4" fmla="*/ 4756727 w 4756727"/>
+              <a:gd name="connsiteY4" fmla="*/ 1819611 h 1888342"/>
+              <a:gd name="connsiteX0" fmla="*/ 0 w 4378036"/>
+              <a:gd name="connsiteY0" fmla="*/ 1856555 h 1888342"/>
+              <a:gd name="connsiteX1" fmla="*/ 905164 w 4378036"/>
+              <a:gd name="connsiteY1" fmla="*/ 1699538 h 1888342"/>
+              <a:gd name="connsiteX2" fmla="*/ 2346037 w 4378036"/>
+              <a:gd name="connsiteY2" fmla="*/ 47 h 1888342"/>
+              <a:gd name="connsiteX3" fmla="*/ 3657601 w 4378036"/>
+              <a:gd name="connsiteY3" fmla="*/ 1644118 h 1888342"/>
+              <a:gd name="connsiteX4" fmla="*/ 4378036 w 4378036"/>
+              <a:gd name="connsiteY4" fmla="*/ 1828847 h 1888342"/>
+            </a:gdLst>
+            <a:ahLst/>
+            <a:cxnLst>
+              <a:cxn ang="0">
+                <a:pos x="connsiteX0" y="connsiteY0"/>
+              </a:cxn>
+              <a:cxn ang="0">
+                <a:pos x="connsiteX1" y="connsiteY1"/>
+              </a:cxn>
+              <a:cxn ang="0">
+                <a:pos x="connsiteX2" y="connsiteY2"/>
+              </a:cxn>
+              <a:cxn ang="0">
+                <a:pos x="connsiteX3" y="connsiteY3"/>
+              </a:cxn>
+              <a:cxn ang="0">
+                <a:pos x="connsiteX4" y="connsiteY4"/>
+              </a:cxn>
+            </a:cxnLst>
+            <a:rect l="l" t="t" r="r" b="b"/>
+            <a:pathLst>
+              <a:path w="4378036" h="1888342">
+                <a:moveTo>
+                  <a:pt x="0" y="1856555"/>
+                </a:moveTo>
+                <a:cubicBezTo>
+                  <a:pt x="340206" y="1841161"/>
+                  <a:pt x="514158" y="2008956"/>
+                  <a:pt x="905164" y="1699538"/>
+                </a:cubicBezTo>
+                <a:cubicBezTo>
+                  <a:pt x="1296170" y="1390120"/>
+                  <a:pt x="1887298" y="9284"/>
+                  <a:pt x="2346037" y="47"/>
+                </a:cubicBezTo>
+                <a:cubicBezTo>
+                  <a:pt x="2804776" y="-9190"/>
+                  <a:pt x="3255819" y="1340857"/>
+                  <a:pt x="3657601" y="1644118"/>
+                </a:cubicBezTo>
+                <a:cubicBezTo>
+                  <a:pt x="4059383" y="1947379"/>
+                  <a:pt x="4230254" y="1853477"/>
+                  <a:pt x="4378036" y="1828847"/>
+                </a:cubicBezTo>
+              </a:path>
+            </a:pathLst>
+          </a:custGeom>
+          <a:noFill/>
+          <a:ln w="50800">
+            <a:gradFill>
+              <a:gsLst>
+                <a:gs pos="100000">
+                  <a:schemeClr val="tx2">
+                    <a:lumMod val="20000"/>
+                    <a:lumOff val="80000"/>
+                  </a:schemeClr>
+                </a:gs>
+                <a:gs pos="0">
+                  <a:srgbClr val="C00000"/>
+                </a:gs>
+                <a:gs pos="100000">
+                  <a:schemeClr val="bg1">
+                    <a:lumMod val="95000"/>
+                  </a:schemeClr>
+                </a:gs>
+              </a:gsLst>
+              <a:lin ang="5400000" scaled="1"/>
+            </a:gradFill>
+          </a:ln>
+        </p:spPr>
+        <p:style>
+          <a:lnRef idx="2">
+            <a:schemeClr val="accent1">
+              <a:shade val="50000"/>
+            </a:schemeClr>
+          </a:lnRef>
+          <a:fillRef idx="1">
+            <a:schemeClr val="accent1"/>
+          </a:fillRef>
+          <a:effectRef idx="0">
+            <a:schemeClr val="accent1"/>
+          </a:effectRef>
+          <a:fontRef idx="minor">
+            <a:schemeClr val="lt1"/>
+          </a:fontRef>
+        </p:style>
+        <p:txBody>
+          <a:bodyPr rtlCol="0" anchor="ctr"/>
+          <a:lstStyle/>
+          <a:p>
+            <a:pPr algn="ctr"/>
+            <a:endParaRPr lang="en-US">
+              <a:solidFill>
+                <a:srgbClr val="C00000"/>
+              </a:solidFill>
+            </a:endParaRPr>
+          </a:p>
+        </p:txBody>
+      </p:sp>
+      <p:cxnSp>
+        <p:nvCxnSpPr>
+          <p:cNvPr id="7" name="Straight Connector 6">
+            <a:extLst>
+              <a:ext uri="{FF2B5EF4-FFF2-40B4-BE49-F238E27FC236}">
+                <a16:creationId xmlns:a16="http://schemas.microsoft.com/office/drawing/2014/main" id="{32057FEC-F0EB-49D5-AA38-EAD16C37FCBC}"/>
+              </a:ext>
+            </a:extLst>
+          </p:cNvPr>
+          <p:cNvCxnSpPr>
+            <a:cxnSpLocks/>
+          </p:cNvCxnSpPr>
+          <p:nvPr/>
+        </p:nvCxnSpPr>
+        <p:spPr bwMode="gray">
+          <a:xfrm>
+            <a:off x="9194246" y="4144033"/>
+            <a:ext cx="0" cy="1183533"/>
+          </a:xfrm>
+          <a:prstGeom prst="line">
+            <a:avLst/>
+          </a:prstGeom>
+          <a:ln w="25400">
+            <a:gradFill>
+              <a:gsLst>
+                <a:gs pos="100000">
+                  <a:schemeClr val="tx2">
+                    <a:lumMod val="20000"/>
+                    <a:lumOff val="80000"/>
+                  </a:schemeClr>
+                </a:gs>
+                <a:gs pos="0">
+                  <a:srgbClr val="C00000"/>
+                </a:gs>
+              </a:gsLst>
+              <a:lin ang="5400000" scaled="1"/>
+            </a:gradFill>
+            <a:prstDash val="solid"/>
+          </a:ln>
+        </p:spPr>
+        <p:style>
+          <a:lnRef idx="1">
+            <a:schemeClr val="accent1"/>
+          </a:lnRef>
+          <a:fillRef idx="0">
+            <a:schemeClr val="accent1"/>
+          </a:fillRef>
+          <a:effectRef idx="0">
+            <a:schemeClr val="accent1"/>
+          </a:effectRef>
+          <a:fontRef idx="minor">
+            <a:schemeClr val="tx1"/>
+          </a:fontRef>
+        </p:style>
+      </p:cxnSp>
+      <p:cxnSp>
+        <p:nvCxnSpPr>
+          <p:cNvPr id="9" name="Straight Connector 8">
+            <a:extLst>
+              <a:ext uri="{FF2B5EF4-FFF2-40B4-BE49-F238E27FC236}">
+                <a16:creationId xmlns:a16="http://schemas.microsoft.com/office/drawing/2014/main" id="{C5A9C1DA-4004-4B86-968F-040F6C4228DE}"/>
+              </a:ext>
+            </a:extLst>
+          </p:cNvPr>
+          <p:cNvCxnSpPr>
+            <a:cxnSpLocks/>
+          </p:cNvCxnSpPr>
+          <p:nvPr/>
+        </p:nvCxnSpPr>
+        <p:spPr bwMode="gray">
+          <a:xfrm>
+            <a:off x="9847012" y="3535173"/>
+            <a:ext cx="0" cy="1792393"/>
+          </a:xfrm>
+          <a:prstGeom prst="line">
+            <a:avLst/>
+          </a:prstGeom>
+          <a:ln w="25400">
+            <a:gradFill>
+              <a:gsLst>
+                <a:gs pos="100000">
+                  <a:schemeClr val="tx2">
+                    <a:lumMod val="20000"/>
+                    <a:lumOff val="80000"/>
+                  </a:schemeClr>
+                </a:gs>
+                <a:gs pos="0">
+                  <a:srgbClr val="C00000"/>
+                </a:gs>
+              </a:gsLst>
+              <a:lin ang="5400000" scaled="1"/>
+            </a:gradFill>
+            <a:prstDash val="solid"/>
+          </a:ln>
+        </p:spPr>
+        <p:style>
+          <a:lnRef idx="1">
+            <a:schemeClr val="accent1"/>
+          </a:lnRef>
+          <a:fillRef idx="0">
+            <a:schemeClr val="accent1"/>
+          </a:fillRef>
+          <a:effectRef idx="0">
+            <a:schemeClr val="accent1"/>
+          </a:effectRef>
+          <a:fontRef idx="minor">
+            <a:schemeClr val="tx1"/>
+          </a:fontRef>
+        </p:style>
+      </p:cxnSp>
+      <p:cxnSp>
+        <p:nvCxnSpPr>
+          <p:cNvPr id="10" name="Straight Connector 9">
+            <a:extLst>
+              <a:ext uri="{FF2B5EF4-FFF2-40B4-BE49-F238E27FC236}">
+                <a16:creationId xmlns:a16="http://schemas.microsoft.com/office/drawing/2014/main" id="{278F964B-0173-456D-8109-5F02B4FCED4B}"/>
+              </a:ext>
+            </a:extLst>
+          </p:cNvPr>
+          <p:cNvCxnSpPr>
+            <a:cxnSpLocks/>
+          </p:cNvCxnSpPr>
+          <p:nvPr/>
+        </p:nvCxnSpPr>
+        <p:spPr bwMode="gray">
+          <a:xfrm>
+            <a:off x="10478099" y="4052948"/>
+            <a:ext cx="0" cy="1291653"/>
+          </a:xfrm>
+          <a:prstGeom prst="line">
+            <a:avLst/>
+          </a:prstGeom>
+          <a:ln w="25400">
+            <a:gradFill>
+              <a:gsLst>
+                <a:gs pos="100000">
+                  <a:schemeClr val="tx2">
+                    <a:lumMod val="20000"/>
+                    <a:lumOff val="80000"/>
+                  </a:schemeClr>
+                </a:gs>
+                <a:gs pos="0">
+                  <a:srgbClr val="C00000"/>
+                </a:gs>
+              </a:gsLst>
+              <a:lin ang="5400000" scaled="1"/>
+            </a:gradFill>
+            <a:prstDash val="solid"/>
+          </a:ln>
+        </p:spPr>
+        <p:style>
+          <a:lnRef idx="1">
+            <a:schemeClr val="accent1"/>
+          </a:lnRef>
+          <a:fillRef idx="0">
+            <a:schemeClr val="accent1"/>
+          </a:fillRef>
+          <a:effectRef idx="0">
+            <a:schemeClr val="accent1"/>
+          </a:effectRef>
+          <a:fontRef idx="minor">
+            <a:schemeClr val="tx1"/>
+          </a:fontRef>
+        </p:style>
+      </p:cxnSp>
+      <p:sp>
+        <p:nvSpPr>
+          <p:cNvPr id="11" name="Inhaltsplatzhalter 2">
+            <a:extLst>
+              <a:ext uri="{FF2B5EF4-FFF2-40B4-BE49-F238E27FC236}">
+                <a16:creationId xmlns:a16="http://schemas.microsoft.com/office/drawing/2014/main" id="{E2520588-F386-4523-8A22-3588EA370262}"/>
+              </a:ext>
+            </a:extLst>
+          </p:cNvPr>
+          <p:cNvSpPr txBox="1">
+            <a:spLocks/>
+          </p:cNvSpPr>
+          <p:nvPr/>
+        </p:nvSpPr>
+        <p:spPr bwMode="black">
+          <a:xfrm>
+            <a:off x="8487984" y="5026710"/>
+            <a:ext cx="640856" cy="351656"/>
+          </a:xfrm>
+          <a:prstGeom prst="rect">
+            <a:avLst/>
+          </a:prstGeom>
+        </p:spPr>
+        <p:txBody>
+          <a:bodyPr lIns="0" tIns="0" rIns="0"/>
+          <a:lstStyle>
+            <a:lvl1pPr marL="0" indent="0" algn="l" defTabSz="914400" rtl="0" eaLnBrk="1" latinLnBrk="0" hangingPunct="1">
+              <a:lnSpc>
+                <a:spcPct val="110000"/>
+              </a:lnSpc>
+              <a:spcBef>
+                <a:spcPts val="1800"/>
+              </a:spcBef>
+              <a:spcAft>
+                <a:spcPts val="0"/>
+              </a:spcAft>
+              <a:buFont typeface="Arial" panose="020B0604020202020204" pitchFamily="34" charset="0"/>
+              <a:buNone/>
+              <a:defRPr sz="2000" b="0" kern="1200">
+                <a:solidFill>
+                  <a:schemeClr val="tx1"/>
+                </a:solidFill>
+                <a:latin typeface="+mj-lt"/>
+                <a:ea typeface="+mn-ea"/>
+                <a:cs typeface="+mn-cs"/>
+              </a:defRPr>
+            </a:lvl1pPr>
+            <a:lvl2pPr marL="0" indent="0" algn="l" defTabSz="914400" rtl="0" eaLnBrk="1" latinLnBrk="0" hangingPunct="1">
+              <a:lnSpc>
+                <a:spcPct val="110000"/>
+              </a:lnSpc>
+              <a:spcBef>
+                <a:spcPts val="600"/>
+              </a:spcBef>
+              <a:spcAft>
+                <a:spcPts val="600"/>
+              </a:spcAft>
+              <a:buFont typeface="Arial" panose="020B0604020202020204" pitchFamily="34" charset="0"/>
+              <a:buNone/>
+              <a:defRPr sz="2000" kern="1200">
+                <a:solidFill>
+                  <a:schemeClr val="tx1"/>
+                </a:solidFill>
+                <a:latin typeface="+mn-lt"/>
+                <a:ea typeface="+mn-ea"/>
+                <a:cs typeface="+mn-cs"/>
+              </a:defRPr>
+            </a:lvl2pPr>
+            <a:lvl3pPr marL="180000" indent="-180000" algn="l" defTabSz="914400" rtl="0" eaLnBrk="1" latinLnBrk="0" hangingPunct="1">
+              <a:lnSpc>
+                <a:spcPct val="110000"/>
+              </a:lnSpc>
+              <a:spcBef>
+                <a:spcPts val="200"/>
+              </a:spcBef>
+              <a:spcAft>
+                <a:spcPts val="200"/>
+              </a:spcAft>
+              <a:buFont typeface="Arial" panose="020B0604020202020204" pitchFamily="34" charset="0"/>
+              <a:buChar char="•"/>
+              <a:defRPr sz="2000" kern="1200">
+                <a:solidFill>
+                  <a:schemeClr val="tx1"/>
+                </a:solidFill>
+                <a:latin typeface="+mn-lt"/>
+                <a:ea typeface="+mn-ea"/>
+                <a:cs typeface="+mn-cs"/>
+              </a:defRPr>
+            </a:lvl3pPr>
+            <a:lvl4pPr marL="360000" indent="-180000" algn="l" defTabSz="914400" rtl="0" eaLnBrk="1" latinLnBrk="0" hangingPunct="1">
+              <a:lnSpc>
+                <a:spcPct val="110000"/>
+              </a:lnSpc>
+              <a:spcBef>
+                <a:spcPts val="200"/>
+              </a:spcBef>
+              <a:spcAft>
+                <a:spcPts val="200"/>
+              </a:spcAft>
+              <a:buFont typeface="Symbol" panose="05050102010706020507" pitchFamily="18" charset="2"/>
+              <a:buChar char="-"/>
+              <a:defRPr sz="2000" kern="1200">
+                <a:solidFill>
+                  <a:schemeClr val="tx1"/>
+                </a:solidFill>
+                <a:latin typeface="+mn-lt"/>
+                <a:ea typeface="+mn-ea"/>
+                <a:cs typeface="+mn-cs"/>
+              </a:defRPr>
+            </a:lvl4pPr>
+            <a:lvl5pPr marL="540000" indent="-180000" algn="l" defTabSz="914400" rtl="0" eaLnBrk="1" latinLnBrk="0" hangingPunct="1">
+              <a:lnSpc>
+                <a:spcPct val="110000"/>
+              </a:lnSpc>
+              <a:spcBef>
+                <a:spcPts val="200"/>
+              </a:spcBef>
+              <a:spcAft>
+                <a:spcPts val="200"/>
+              </a:spcAft>
+              <a:buFont typeface="Symbol" panose="05050102010706020507" pitchFamily="18" charset="2"/>
+              <a:buChar char="-"/>
+              <a:defRPr sz="2000" kern="1200">
+                <a:solidFill>
+                  <a:schemeClr val="tx1"/>
+                </a:solidFill>
+                <a:latin typeface="+mn-lt"/>
+                <a:ea typeface="+mn-ea"/>
+                <a:cs typeface="+mn-cs"/>
+              </a:defRPr>
+            </a:lvl5pPr>
+            <a:lvl6pPr marL="720000" indent="-180000" algn="l" defTabSz="914400" rtl="0" eaLnBrk="1" latinLnBrk="0" hangingPunct="1">
+              <a:lnSpc>
+                <a:spcPct val="110000"/>
+              </a:lnSpc>
+              <a:spcBef>
+                <a:spcPts val="200"/>
+              </a:spcBef>
+              <a:spcAft>
+                <a:spcPts val="200"/>
+              </a:spcAft>
+              <a:buFont typeface="Symbol" panose="05050102010706020507" pitchFamily="18" charset="2"/>
+              <a:buChar char="-"/>
+              <a:defRPr sz="2000" kern="1200">
+                <a:solidFill>
+                  <a:schemeClr val="tx1"/>
+                </a:solidFill>
+                <a:latin typeface="+mn-lt"/>
+                <a:ea typeface="+mn-ea"/>
+                <a:cs typeface="+mn-cs"/>
+              </a:defRPr>
+            </a:lvl6pPr>
+            <a:lvl7pPr marL="720000" indent="-180000" algn="l" defTabSz="914400" rtl="0" eaLnBrk="1" latinLnBrk="0" hangingPunct="1">
+              <a:lnSpc>
+                <a:spcPct val="110000"/>
+              </a:lnSpc>
+              <a:spcBef>
+                <a:spcPts val="200"/>
+              </a:spcBef>
+              <a:spcAft>
+                <a:spcPts val="200"/>
+              </a:spcAft>
+              <a:buFont typeface="Symbol" panose="05050102010706020507" pitchFamily="18" charset="2"/>
+              <a:buChar char="-"/>
+              <a:defRPr sz="2000" kern="1200">
+                <a:solidFill>
+                  <a:schemeClr val="tx1"/>
+                </a:solidFill>
+                <a:latin typeface="+mn-lt"/>
+                <a:ea typeface="+mn-ea"/>
+                <a:cs typeface="+mn-cs"/>
+              </a:defRPr>
+            </a:lvl7pPr>
+            <a:lvl8pPr marL="720000" indent="-180000" algn="l" defTabSz="914400" rtl="0" eaLnBrk="1" latinLnBrk="0" hangingPunct="1">
+              <a:lnSpc>
+                <a:spcPct val="110000"/>
+              </a:lnSpc>
+              <a:spcBef>
+                <a:spcPts val="200"/>
+              </a:spcBef>
+              <a:spcAft>
+                <a:spcPts val="200"/>
+              </a:spcAft>
+              <a:buFont typeface="Symbol" panose="05050102010706020507" pitchFamily="18" charset="2"/>
+              <a:buChar char="-"/>
+              <a:defRPr sz="2000" kern="1200">
+                <a:solidFill>
+                  <a:schemeClr val="tx1"/>
+                </a:solidFill>
+                <a:latin typeface="+mn-lt"/>
+                <a:ea typeface="+mn-ea"/>
+                <a:cs typeface="+mn-cs"/>
+              </a:defRPr>
+            </a:lvl8pPr>
+            <a:lvl9pPr marL="720000" indent="-180000" algn="l" defTabSz="914400" rtl="0" eaLnBrk="1" latinLnBrk="0" hangingPunct="1">
+              <a:lnSpc>
+                <a:spcPct val="110000"/>
+              </a:lnSpc>
+              <a:spcBef>
+                <a:spcPts val="200"/>
+              </a:spcBef>
+              <a:spcAft>
+                <a:spcPts val="200"/>
+              </a:spcAft>
+              <a:buFont typeface="Symbol" panose="05050102010706020507" pitchFamily="18" charset="2"/>
+              <a:buChar char="-"/>
+              <a:defRPr sz="2000" kern="1200">
+                <a:solidFill>
+                  <a:schemeClr val="tx1"/>
+                </a:solidFill>
+                <a:latin typeface="+mn-lt"/>
+                <a:ea typeface="+mn-ea"/>
+                <a:cs typeface="+mn-cs"/>
+              </a:defRPr>
+            </a:lvl9pPr>
+          </a:lstStyle>
+          <a:p>
+            <a:pPr lvl="1" algn="ctr"/>
+            <a:r>
+              <a:rPr lang="en-US" sz="1100">
+                <a:solidFill>
+                  <a:srgbClr val="C00000"/>
+                </a:solidFill>
+              </a:rPr>
+              <a:t>Early</a:t>
+            </a:r>
+            <a:br>
+              <a:rPr lang="en-US" sz="1100">
+                <a:solidFill>
+                  <a:srgbClr val="C00000"/>
+                </a:solidFill>
+              </a:rPr>
+            </a:br>
+            <a:r>
+              <a:rPr lang="en-US" sz="1100">
+                <a:solidFill>
+                  <a:srgbClr val="C00000"/>
+                </a:solidFill>
+              </a:rPr>
+              <a:t>adopters </a:t>
+            </a:r>
+          </a:p>
+        </p:txBody>
+      </p:sp>
+      <p:sp>
+        <p:nvSpPr>
+          <p:cNvPr id="12" name="Inhaltsplatzhalter 2">
+            <a:extLst>
+              <a:ext uri="{FF2B5EF4-FFF2-40B4-BE49-F238E27FC236}">
+                <a16:creationId xmlns:a16="http://schemas.microsoft.com/office/drawing/2014/main" id="{4D4F692D-D36C-49FA-BC09-A5C971EE7FF6}"/>
+              </a:ext>
+            </a:extLst>
+          </p:cNvPr>
+          <p:cNvSpPr txBox="1">
+            <a:spLocks/>
+          </p:cNvSpPr>
+          <p:nvPr/>
+        </p:nvSpPr>
+        <p:spPr bwMode="black">
+          <a:xfrm>
+            <a:off x="9213789" y="5026710"/>
+            <a:ext cx="640856" cy="351656"/>
+          </a:xfrm>
+          <a:prstGeom prst="rect">
+            <a:avLst/>
+          </a:prstGeom>
+        </p:spPr>
+        <p:txBody>
+          <a:bodyPr lIns="0" tIns="0" rIns="0"/>
+          <a:lstStyle>
+            <a:lvl1pPr marL="0" indent="0" algn="l" defTabSz="914400" rtl="0" eaLnBrk="1" latinLnBrk="0" hangingPunct="1">
+              <a:lnSpc>
+                <a:spcPct val="110000"/>
+              </a:lnSpc>
+              <a:spcBef>
+                <a:spcPts val="1800"/>
+              </a:spcBef>
+              <a:spcAft>
+                <a:spcPts val="0"/>
+              </a:spcAft>
+              <a:buFont typeface="Arial" panose="020B0604020202020204" pitchFamily="34" charset="0"/>
+              <a:buNone/>
+              <a:defRPr sz="2000" b="0" kern="1200">
+                <a:solidFill>
+                  <a:schemeClr val="tx1"/>
+                </a:solidFill>
+                <a:latin typeface="+mj-lt"/>
+                <a:ea typeface="+mn-ea"/>
+                <a:cs typeface="+mn-cs"/>
+              </a:defRPr>
+            </a:lvl1pPr>
+            <a:lvl2pPr marL="0" indent="0" algn="l" defTabSz="914400" rtl="0" eaLnBrk="1" latinLnBrk="0" hangingPunct="1">
+              <a:lnSpc>
+                <a:spcPct val="110000"/>
+              </a:lnSpc>
+              <a:spcBef>
+                <a:spcPts val="600"/>
+              </a:spcBef>
+              <a:spcAft>
+                <a:spcPts val="600"/>
+              </a:spcAft>
+              <a:buFont typeface="Arial" panose="020B0604020202020204" pitchFamily="34" charset="0"/>
+              <a:buNone/>
+              <a:defRPr sz="2000" kern="1200">
+                <a:solidFill>
+                  <a:schemeClr val="tx1"/>
+                </a:solidFill>
+                <a:latin typeface="+mn-lt"/>
+                <a:ea typeface="+mn-ea"/>
+                <a:cs typeface="+mn-cs"/>
+              </a:defRPr>
+            </a:lvl2pPr>
+            <a:lvl3pPr marL="180000" indent="-180000" algn="l" defTabSz="914400" rtl="0" eaLnBrk="1" latinLnBrk="0" hangingPunct="1">
+              <a:lnSpc>
+                <a:spcPct val="110000"/>
+              </a:lnSpc>
+              <a:spcBef>
+                <a:spcPts val="200"/>
+              </a:spcBef>
+              <a:spcAft>
+                <a:spcPts val="200"/>
+              </a:spcAft>
+              <a:buFont typeface="Arial" panose="020B0604020202020204" pitchFamily="34" charset="0"/>
+              <a:buChar char="•"/>
+              <a:defRPr sz="2000" kern="1200">
+                <a:solidFill>
+                  <a:schemeClr val="tx1"/>
+                </a:solidFill>
+                <a:latin typeface="+mn-lt"/>
+                <a:ea typeface="+mn-ea"/>
+                <a:cs typeface="+mn-cs"/>
+              </a:defRPr>
+            </a:lvl3pPr>
+            <a:lvl4pPr marL="360000" indent="-180000" algn="l" defTabSz="914400" rtl="0" eaLnBrk="1" latinLnBrk="0" hangingPunct="1">
+              <a:lnSpc>
+                <a:spcPct val="110000"/>
+              </a:lnSpc>
+              <a:spcBef>
+                <a:spcPts val="200"/>
+              </a:spcBef>
+              <a:spcAft>
+                <a:spcPts val="200"/>
+              </a:spcAft>
+              <a:buFont typeface="Symbol" panose="05050102010706020507" pitchFamily="18" charset="2"/>
+              <a:buChar char="-"/>
+              <a:defRPr sz="2000" kern="1200">
+                <a:solidFill>
+                  <a:schemeClr val="tx1"/>
+                </a:solidFill>
+                <a:latin typeface="+mn-lt"/>
+                <a:ea typeface="+mn-ea"/>
+                <a:cs typeface="+mn-cs"/>
+              </a:defRPr>
+            </a:lvl4pPr>
+            <a:lvl5pPr marL="540000" indent="-180000" algn="l" defTabSz="914400" rtl="0" eaLnBrk="1" latinLnBrk="0" hangingPunct="1">
+              <a:lnSpc>
+                <a:spcPct val="110000"/>
+              </a:lnSpc>
+              <a:spcBef>
+                <a:spcPts val="200"/>
+              </a:spcBef>
+              <a:spcAft>
+                <a:spcPts val="200"/>
+              </a:spcAft>
+              <a:buFont typeface="Symbol" panose="05050102010706020507" pitchFamily="18" charset="2"/>
+              <a:buChar char="-"/>
+              <a:defRPr sz="2000" kern="1200">
+                <a:solidFill>
+                  <a:schemeClr val="tx1"/>
+                </a:solidFill>
+                <a:latin typeface="+mn-lt"/>
+                <a:ea typeface="+mn-ea"/>
+                <a:cs typeface="+mn-cs"/>
+              </a:defRPr>
+            </a:lvl5pPr>
+            <a:lvl6pPr marL="720000" indent="-180000" algn="l" defTabSz="914400" rtl="0" eaLnBrk="1" latinLnBrk="0" hangingPunct="1">
+              <a:lnSpc>
+                <a:spcPct val="110000"/>
+              </a:lnSpc>
+              <a:spcBef>
+                <a:spcPts val="200"/>
+              </a:spcBef>
+              <a:spcAft>
+                <a:spcPts val="200"/>
+              </a:spcAft>
+              <a:buFont typeface="Symbol" panose="05050102010706020507" pitchFamily="18" charset="2"/>
+              <a:buChar char="-"/>
+              <a:defRPr sz="2000" kern="1200">
+                <a:solidFill>
+                  <a:schemeClr val="tx1"/>
+                </a:solidFill>
+                <a:latin typeface="+mn-lt"/>
+                <a:ea typeface="+mn-ea"/>
+                <a:cs typeface="+mn-cs"/>
+              </a:defRPr>
+            </a:lvl6pPr>
+            <a:lvl7pPr marL="720000" indent="-180000" algn="l" defTabSz="914400" rtl="0" eaLnBrk="1" latinLnBrk="0" hangingPunct="1">
+              <a:lnSpc>
+                <a:spcPct val="110000"/>
+              </a:lnSpc>
+              <a:spcBef>
+                <a:spcPts val="200"/>
+              </a:spcBef>
+              <a:spcAft>
+                <a:spcPts val="200"/>
+              </a:spcAft>
+              <a:buFont typeface="Symbol" panose="05050102010706020507" pitchFamily="18" charset="2"/>
+              <a:buChar char="-"/>
+              <a:defRPr sz="2000" kern="1200">
+                <a:solidFill>
+                  <a:schemeClr val="tx1"/>
+                </a:solidFill>
+                <a:latin typeface="+mn-lt"/>
+                <a:ea typeface="+mn-ea"/>
+                <a:cs typeface="+mn-cs"/>
+              </a:defRPr>
+            </a:lvl7pPr>
+            <a:lvl8pPr marL="720000" indent="-180000" algn="l" defTabSz="914400" rtl="0" eaLnBrk="1" latinLnBrk="0" hangingPunct="1">
+              <a:lnSpc>
+                <a:spcPct val="110000"/>
+              </a:lnSpc>
+              <a:spcBef>
+                <a:spcPts val="200"/>
+              </a:spcBef>
+              <a:spcAft>
+                <a:spcPts val="200"/>
+              </a:spcAft>
+              <a:buFont typeface="Symbol" panose="05050102010706020507" pitchFamily="18" charset="2"/>
+              <a:buChar char="-"/>
+              <a:defRPr sz="2000" kern="1200">
+                <a:solidFill>
+                  <a:schemeClr val="tx1"/>
+                </a:solidFill>
+                <a:latin typeface="+mn-lt"/>
+                <a:ea typeface="+mn-ea"/>
+                <a:cs typeface="+mn-cs"/>
+              </a:defRPr>
+            </a:lvl8pPr>
+            <a:lvl9pPr marL="720000" indent="-180000" algn="l" defTabSz="914400" rtl="0" eaLnBrk="1" latinLnBrk="0" hangingPunct="1">
+              <a:lnSpc>
+                <a:spcPct val="110000"/>
+              </a:lnSpc>
+              <a:spcBef>
+                <a:spcPts val="200"/>
+              </a:spcBef>
+              <a:spcAft>
+                <a:spcPts val="200"/>
+              </a:spcAft>
+              <a:buFont typeface="Symbol" panose="05050102010706020507" pitchFamily="18" charset="2"/>
+              <a:buChar char="-"/>
+              <a:defRPr sz="2000" kern="1200">
+                <a:solidFill>
+                  <a:schemeClr val="tx1"/>
+                </a:solidFill>
+                <a:latin typeface="+mn-lt"/>
+                <a:ea typeface="+mn-ea"/>
+                <a:cs typeface="+mn-cs"/>
+              </a:defRPr>
+            </a:lvl9pPr>
+          </a:lstStyle>
+          <a:p>
+            <a:pPr lvl="1" algn="ctr"/>
+            <a:r>
+              <a:rPr lang="en-US" sz="1100">
+                <a:solidFill>
+                  <a:srgbClr val="C00000"/>
+                </a:solidFill>
+              </a:rPr>
+              <a:t>Early</a:t>
+            </a:r>
+            <a:br>
+              <a:rPr lang="en-US" sz="1100">
+                <a:solidFill>
+                  <a:srgbClr val="C00000"/>
+                </a:solidFill>
+              </a:rPr>
+            </a:br>
+            <a:r>
+              <a:rPr lang="en-US" sz="1100">
+                <a:solidFill>
+                  <a:srgbClr val="C00000"/>
+                </a:solidFill>
+              </a:rPr>
+              <a:t>majority</a:t>
+            </a:r>
+          </a:p>
+        </p:txBody>
+      </p:sp>
+      <p:sp>
+        <p:nvSpPr>
+          <p:cNvPr id="13" name="Inhaltsplatzhalter 2">
+            <a:extLst>
+              <a:ext uri="{FF2B5EF4-FFF2-40B4-BE49-F238E27FC236}">
+                <a16:creationId xmlns:a16="http://schemas.microsoft.com/office/drawing/2014/main" id="{DB2D09A8-2533-4F1A-89D7-D11B95BE0D46}"/>
+              </a:ext>
+            </a:extLst>
+          </p:cNvPr>
+          <p:cNvSpPr txBox="1">
+            <a:spLocks/>
+          </p:cNvSpPr>
+          <p:nvPr/>
+        </p:nvSpPr>
+        <p:spPr bwMode="black">
+          <a:xfrm>
+            <a:off x="9864415" y="5033671"/>
+            <a:ext cx="640856" cy="351656"/>
+          </a:xfrm>
+          <a:prstGeom prst="rect">
+            <a:avLst/>
+          </a:prstGeom>
+        </p:spPr>
+        <p:txBody>
+          <a:bodyPr lIns="0" tIns="0" rIns="0"/>
+          <a:lstStyle>
+            <a:lvl1pPr marL="0" indent="0" algn="l" defTabSz="914400" rtl="0" eaLnBrk="1" latinLnBrk="0" hangingPunct="1">
+              <a:lnSpc>
+                <a:spcPct val="110000"/>
+              </a:lnSpc>
+              <a:spcBef>
+                <a:spcPts val="1800"/>
+              </a:spcBef>
+              <a:spcAft>
+                <a:spcPts val="0"/>
+              </a:spcAft>
+              <a:buFont typeface="Arial" panose="020B0604020202020204" pitchFamily="34" charset="0"/>
+              <a:buNone/>
+              <a:defRPr sz="2000" b="0" kern="1200">
+                <a:solidFill>
+                  <a:schemeClr val="tx1"/>
+                </a:solidFill>
+                <a:latin typeface="+mj-lt"/>
+                <a:ea typeface="+mn-ea"/>
+                <a:cs typeface="+mn-cs"/>
+              </a:defRPr>
+            </a:lvl1pPr>
+            <a:lvl2pPr marL="0" indent="0" algn="l" defTabSz="914400" rtl="0" eaLnBrk="1" latinLnBrk="0" hangingPunct="1">
+              <a:lnSpc>
+                <a:spcPct val="110000"/>
+              </a:lnSpc>
+              <a:spcBef>
+                <a:spcPts val="600"/>
+              </a:spcBef>
+              <a:spcAft>
+                <a:spcPts val="600"/>
+              </a:spcAft>
+              <a:buFont typeface="Arial" panose="020B0604020202020204" pitchFamily="34" charset="0"/>
+              <a:buNone/>
+              <a:defRPr sz="2000" kern="1200">
+                <a:solidFill>
+                  <a:schemeClr val="tx1"/>
+                </a:solidFill>
+                <a:latin typeface="+mn-lt"/>
+                <a:ea typeface="+mn-ea"/>
+                <a:cs typeface="+mn-cs"/>
+              </a:defRPr>
+            </a:lvl2pPr>
+            <a:lvl3pPr marL="180000" indent="-180000" algn="l" defTabSz="914400" rtl="0" eaLnBrk="1" latinLnBrk="0" hangingPunct="1">
+              <a:lnSpc>
+                <a:spcPct val="110000"/>
+              </a:lnSpc>
+              <a:spcBef>
+                <a:spcPts val="200"/>
+              </a:spcBef>
+              <a:spcAft>
+                <a:spcPts val="200"/>
+              </a:spcAft>
+              <a:buFont typeface="Arial" panose="020B0604020202020204" pitchFamily="34" charset="0"/>
+              <a:buChar char="•"/>
+              <a:defRPr sz="2000" kern="1200">
+                <a:solidFill>
+                  <a:schemeClr val="tx1"/>
+                </a:solidFill>
+                <a:latin typeface="+mn-lt"/>
+                <a:ea typeface="+mn-ea"/>
+                <a:cs typeface="+mn-cs"/>
+              </a:defRPr>
+            </a:lvl3pPr>
+            <a:lvl4pPr marL="360000" indent="-180000" algn="l" defTabSz="914400" rtl="0" eaLnBrk="1" latinLnBrk="0" hangingPunct="1">
+              <a:lnSpc>
+                <a:spcPct val="110000"/>
+              </a:lnSpc>
+              <a:spcBef>
+                <a:spcPts val="200"/>
+              </a:spcBef>
+              <a:spcAft>
+                <a:spcPts val="200"/>
+              </a:spcAft>
+              <a:buFont typeface="Symbol" panose="05050102010706020507" pitchFamily="18" charset="2"/>
+              <a:buChar char="-"/>
+              <a:defRPr sz="2000" kern="1200">
+                <a:solidFill>
+                  <a:schemeClr val="tx1"/>
+                </a:solidFill>
+                <a:latin typeface="+mn-lt"/>
+                <a:ea typeface="+mn-ea"/>
+                <a:cs typeface="+mn-cs"/>
+              </a:defRPr>
+            </a:lvl4pPr>
+            <a:lvl5pPr marL="540000" indent="-180000" algn="l" defTabSz="914400" rtl="0" eaLnBrk="1" latinLnBrk="0" hangingPunct="1">
+              <a:lnSpc>
+                <a:spcPct val="110000"/>
+              </a:lnSpc>
+              <a:spcBef>
+                <a:spcPts val="200"/>
+              </a:spcBef>
+              <a:spcAft>
+                <a:spcPts val="200"/>
+              </a:spcAft>
+              <a:buFont typeface="Symbol" panose="05050102010706020507" pitchFamily="18" charset="2"/>
+              <a:buChar char="-"/>
+              <a:defRPr sz="2000" kern="1200">
+                <a:solidFill>
+                  <a:schemeClr val="tx1"/>
+                </a:solidFill>
+                <a:latin typeface="+mn-lt"/>
+                <a:ea typeface="+mn-ea"/>
+                <a:cs typeface="+mn-cs"/>
+              </a:defRPr>
+            </a:lvl5pPr>
+            <a:lvl6pPr marL="720000" indent="-180000" algn="l" defTabSz="914400" rtl="0" eaLnBrk="1" latinLnBrk="0" hangingPunct="1">
+              <a:lnSpc>
+                <a:spcPct val="110000"/>
+              </a:lnSpc>
+              <a:spcBef>
+                <a:spcPts val="200"/>
+              </a:spcBef>
+              <a:spcAft>
+                <a:spcPts val="200"/>
+              </a:spcAft>
+              <a:buFont typeface="Symbol" panose="05050102010706020507" pitchFamily="18" charset="2"/>
+              <a:buChar char="-"/>
+              <a:defRPr sz="2000" kern="1200">
+                <a:solidFill>
+                  <a:schemeClr val="tx1"/>
+                </a:solidFill>
+                <a:latin typeface="+mn-lt"/>
+                <a:ea typeface="+mn-ea"/>
+                <a:cs typeface="+mn-cs"/>
+              </a:defRPr>
+            </a:lvl6pPr>
+            <a:lvl7pPr marL="720000" indent="-180000" algn="l" defTabSz="914400" rtl="0" eaLnBrk="1" latinLnBrk="0" hangingPunct="1">
+              <a:lnSpc>
+                <a:spcPct val="110000"/>
+              </a:lnSpc>
+              <a:spcBef>
+                <a:spcPts val="200"/>
+              </a:spcBef>
+              <a:spcAft>
+                <a:spcPts val="200"/>
+              </a:spcAft>
+              <a:buFont typeface="Symbol" panose="05050102010706020507" pitchFamily="18" charset="2"/>
+              <a:buChar char="-"/>
+              <a:defRPr sz="2000" kern="1200">
+                <a:solidFill>
+                  <a:schemeClr val="tx1"/>
+                </a:solidFill>
+                <a:latin typeface="+mn-lt"/>
+                <a:ea typeface="+mn-ea"/>
+                <a:cs typeface="+mn-cs"/>
+              </a:defRPr>
+            </a:lvl7pPr>
+            <a:lvl8pPr marL="720000" indent="-180000" algn="l" defTabSz="914400" rtl="0" eaLnBrk="1" latinLnBrk="0" hangingPunct="1">
+              <a:lnSpc>
+                <a:spcPct val="110000"/>
+              </a:lnSpc>
+              <a:spcBef>
+                <a:spcPts val="200"/>
+              </a:spcBef>
+              <a:spcAft>
+                <a:spcPts val="200"/>
+              </a:spcAft>
+              <a:buFont typeface="Symbol" panose="05050102010706020507" pitchFamily="18" charset="2"/>
+              <a:buChar char="-"/>
+              <a:defRPr sz="2000" kern="1200">
+                <a:solidFill>
+                  <a:schemeClr val="tx1"/>
+                </a:solidFill>
+                <a:latin typeface="+mn-lt"/>
+                <a:ea typeface="+mn-ea"/>
+                <a:cs typeface="+mn-cs"/>
+              </a:defRPr>
+            </a:lvl8pPr>
+            <a:lvl9pPr marL="720000" indent="-180000" algn="l" defTabSz="914400" rtl="0" eaLnBrk="1" latinLnBrk="0" hangingPunct="1">
+              <a:lnSpc>
+                <a:spcPct val="110000"/>
+              </a:lnSpc>
+              <a:spcBef>
+                <a:spcPts val="200"/>
+              </a:spcBef>
+              <a:spcAft>
+                <a:spcPts val="200"/>
+              </a:spcAft>
+              <a:buFont typeface="Symbol" panose="05050102010706020507" pitchFamily="18" charset="2"/>
+              <a:buChar char="-"/>
+              <a:defRPr sz="2000" kern="1200">
+                <a:solidFill>
+                  <a:schemeClr val="tx1"/>
+                </a:solidFill>
+                <a:latin typeface="+mn-lt"/>
+                <a:ea typeface="+mn-ea"/>
+                <a:cs typeface="+mn-cs"/>
+              </a:defRPr>
+            </a:lvl9pPr>
+          </a:lstStyle>
+          <a:p>
+            <a:pPr lvl="1" algn="ctr"/>
+            <a:r>
+              <a:rPr lang="en-US" sz="1100">
+                <a:solidFill>
+                  <a:srgbClr val="C00000"/>
+                </a:solidFill>
+              </a:rPr>
+              <a:t>Late</a:t>
+            </a:r>
+            <a:br>
+              <a:rPr lang="en-US" sz="1100">
+                <a:solidFill>
+                  <a:srgbClr val="C00000"/>
+                </a:solidFill>
+              </a:rPr>
+            </a:br>
+            <a:r>
+              <a:rPr lang="en-US" sz="1100">
+                <a:solidFill>
+                  <a:srgbClr val="C00000"/>
+                </a:solidFill>
+              </a:rPr>
+              <a:t>majority</a:t>
+            </a:r>
+          </a:p>
+        </p:txBody>
+      </p:sp>
+      <p:sp>
+        <p:nvSpPr>
+          <p:cNvPr id="14" name="Inhaltsplatzhalter 2">
+            <a:extLst>
+              <a:ext uri="{FF2B5EF4-FFF2-40B4-BE49-F238E27FC236}">
+                <a16:creationId xmlns:a16="http://schemas.microsoft.com/office/drawing/2014/main" id="{A1D73AD4-DDE2-4A74-8191-7974389302C6}"/>
+              </a:ext>
+            </a:extLst>
+          </p:cNvPr>
+          <p:cNvSpPr txBox="1">
+            <a:spLocks/>
+          </p:cNvSpPr>
+          <p:nvPr/>
+        </p:nvSpPr>
+        <p:spPr bwMode="black">
+          <a:xfrm>
+            <a:off x="10534585" y="5009828"/>
+            <a:ext cx="640856" cy="351656"/>
+          </a:xfrm>
+          <a:prstGeom prst="rect">
+            <a:avLst/>
+          </a:prstGeom>
+        </p:spPr>
+        <p:txBody>
+          <a:bodyPr lIns="0" tIns="0" rIns="0"/>
+          <a:lstStyle>
+            <a:lvl1pPr marL="0" indent="0" algn="l" defTabSz="914400" rtl="0" eaLnBrk="1" latinLnBrk="0" hangingPunct="1">
+              <a:lnSpc>
+                <a:spcPct val="110000"/>
+              </a:lnSpc>
+              <a:spcBef>
+                <a:spcPts val="1800"/>
+              </a:spcBef>
+              <a:spcAft>
+                <a:spcPts val="0"/>
+              </a:spcAft>
+              <a:buFont typeface="Arial" panose="020B0604020202020204" pitchFamily="34" charset="0"/>
+              <a:buNone/>
+              <a:defRPr sz="2000" b="0" kern="1200">
+                <a:solidFill>
+                  <a:schemeClr val="tx1"/>
+                </a:solidFill>
+                <a:latin typeface="+mj-lt"/>
+                <a:ea typeface="+mn-ea"/>
+                <a:cs typeface="+mn-cs"/>
+              </a:defRPr>
+            </a:lvl1pPr>
+            <a:lvl2pPr marL="0" indent="0" algn="l" defTabSz="914400" rtl="0" eaLnBrk="1" latinLnBrk="0" hangingPunct="1">
+              <a:lnSpc>
+                <a:spcPct val="110000"/>
+              </a:lnSpc>
+              <a:spcBef>
+                <a:spcPts val="600"/>
+              </a:spcBef>
+              <a:spcAft>
+                <a:spcPts val="600"/>
+              </a:spcAft>
+              <a:buFont typeface="Arial" panose="020B0604020202020204" pitchFamily="34" charset="0"/>
+              <a:buNone/>
+              <a:defRPr sz="2000" kern="1200">
+                <a:solidFill>
+                  <a:schemeClr val="tx1"/>
+                </a:solidFill>
+                <a:latin typeface="+mn-lt"/>
+                <a:ea typeface="+mn-ea"/>
+                <a:cs typeface="+mn-cs"/>
+              </a:defRPr>
+            </a:lvl2pPr>
+            <a:lvl3pPr marL="180000" indent="-180000" algn="l" defTabSz="914400" rtl="0" eaLnBrk="1" latinLnBrk="0" hangingPunct="1">
+              <a:lnSpc>
+                <a:spcPct val="110000"/>
+              </a:lnSpc>
+              <a:spcBef>
+                <a:spcPts val="200"/>
+              </a:spcBef>
+              <a:spcAft>
+                <a:spcPts val="200"/>
+              </a:spcAft>
+              <a:buFont typeface="Arial" panose="020B0604020202020204" pitchFamily="34" charset="0"/>
+              <a:buChar char="•"/>
+              <a:defRPr sz="2000" kern="1200">
+                <a:solidFill>
+                  <a:schemeClr val="tx1"/>
+                </a:solidFill>
+                <a:latin typeface="+mn-lt"/>
+                <a:ea typeface="+mn-ea"/>
+                <a:cs typeface="+mn-cs"/>
+              </a:defRPr>
+            </a:lvl3pPr>
+            <a:lvl4pPr marL="360000" indent="-180000" algn="l" defTabSz="914400" rtl="0" eaLnBrk="1" latinLnBrk="0" hangingPunct="1">
+              <a:lnSpc>
+                <a:spcPct val="110000"/>
+              </a:lnSpc>
+              <a:spcBef>
+                <a:spcPts val="200"/>
+              </a:spcBef>
+              <a:spcAft>
+                <a:spcPts val="200"/>
+              </a:spcAft>
+              <a:buFont typeface="Symbol" panose="05050102010706020507" pitchFamily="18" charset="2"/>
+              <a:buChar char="-"/>
+              <a:defRPr sz="2000" kern="1200">
+                <a:solidFill>
+                  <a:schemeClr val="tx1"/>
+                </a:solidFill>
+                <a:latin typeface="+mn-lt"/>
+                <a:ea typeface="+mn-ea"/>
+                <a:cs typeface="+mn-cs"/>
+              </a:defRPr>
+            </a:lvl4pPr>
+            <a:lvl5pPr marL="540000" indent="-180000" algn="l" defTabSz="914400" rtl="0" eaLnBrk="1" latinLnBrk="0" hangingPunct="1">
+              <a:lnSpc>
+                <a:spcPct val="110000"/>
+              </a:lnSpc>
+              <a:spcBef>
+                <a:spcPts val="200"/>
+              </a:spcBef>
+              <a:spcAft>
+                <a:spcPts val="200"/>
+              </a:spcAft>
+              <a:buFont typeface="Symbol" panose="05050102010706020507" pitchFamily="18" charset="2"/>
+              <a:buChar char="-"/>
+              <a:defRPr sz="2000" kern="1200">
+                <a:solidFill>
+                  <a:schemeClr val="tx1"/>
+                </a:solidFill>
+                <a:latin typeface="+mn-lt"/>
+                <a:ea typeface="+mn-ea"/>
+                <a:cs typeface="+mn-cs"/>
+              </a:defRPr>
+            </a:lvl5pPr>
+            <a:lvl6pPr marL="720000" indent="-180000" algn="l" defTabSz="914400" rtl="0" eaLnBrk="1" latinLnBrk="0" hangingPunct="1">
+              <a:lnSpc>
+                <a:spcPct val="110000"/>
+              </a:lnSpc>
+              <a:spcBef>
+                <a:spcPts val="200"/>
+              </a:spcBef>
+              <a:spcAft>
+                <a:spcPts val="200"/>
+              </a:spcAft>
+              <a:buFont typeface="Symbol" panose="05050102010706020507" pitchFamily="18" charset="2"/>
+              <a:buChar char="-"/>
+              <a:defRPr sz="2000" kern="1200">
+                <a:solidFill>
+                  <a:schemeClr val="tx1"/>
+                </a:solidFill>
+                <a:latin typeface="+mn-lt"/>
+                <a:ea typeface="+mn-ea"/>
+                <a:cs typeface="+mn-cs"/>
+              </a:defRPr>
+            </a:lvl6pPr>
+            <a:lvl7pPr marL="720000" indent="-180000" algn="l" defTabSz="914400" rtl="0" eaLnBrk="1" latinLnBrk="0" hangingPunct="1">
+              <a:lnSpc>
+                <a:spcPct val="110000"/>
+              </a:lnSpc>
+              <a:spcBef>
+                <a:spcPts val="200"/>
+              </a:spcBef>
+              <a:spcAft>
+                <a:spcPts val="200"/>
+              </a:spcAft>
+              <a:buFont typeface="Symbol" panose="05050102010706020507" pitchFamily="18" charset="2"/>
+              <a:buChar char="-"/>
+              <a:defRPr sz="2000" kern="1200">
+                <a:solidFill>
+                  <a:schemeClr val="tx1"/>
+                </a:solidFill>
+                <a:latin typeface="+mn-lt"/>
+                <a:ea typeface="+mn-ea"/>
+                <a:cs typeface="+mn-cs"/>
+              </a:defRPr>
+            </a:lvl7pPr>
+            <a:lvl8pPr marL="720000" indent="-180000" algn="l" defTabSz="914400" rtl="0" eaLnBrk="1" latinLnBrk="0" hangingPunct="1">
+              <a:lnSpc>
+                <a:spcPct val="110000"/>
+              </a:lnSpc>
+              <a:spcBef>
+                <a:spcPts val="200"/>
+              </a:spcBef>
+              <a:spcAft>
+                <a:spcPts val="200"/>
+              </a:spcAft>
+              <a:buFont typeface="Symbol" panose="05050102010706020507" pitchFamily="18" charset="2"/>
+              <a:buChar char="-"/>
+              <a:defRPr sz="2000" kern="1200">
+                <a:solidFill>
+                  <a:schemeClr val="tx1"/>
+                </a:solidFill>
+                <a:latin typeface="+mn-lt"/>
+                <a:ea typeface="+mn-ea"/>
+                <a:cs typeface="+mn-cs"/>
+              </a:defRPr>
+            </a:lvl8pPr>
+            <a:lvl9pPr marL="720000" indent="-180000" algn="l" defTabSz="914400" rtl="0" eaLnBrk="1" latinLnBrk="0" hangingPunct="1">
+              <a:lnSpc>
+                <a:spcPct val="110000"/>
+              </a:lnSpc>
+              <a:spcBef>
+                <a:spcPts val="200"/>
+              </a:spcBef>
+              <a:spcAft>
+                <a:spcPts val="200"/>
+              </a:spcAft>
+              <a:buFont typeface="Symbol" panose="05050102010706020507" pitchFamily="18" charset="2"/>
+              <a:buChar char="-"/>
+              <a:defRPr sz="2000" kern="1200">
+                <a:solidFill>
+                  <a:schemeClr val="tx1"/>
+                </a:solidFill>
+                <a:latin typeface="+mn-lt"/>
+                <a:ea typeface="+mn-ea"/>
+                <a:cs typeface="+mn-cs"/>
+              </a:defRPr>
+            </a:lvl9pPr>
+          </a:lstStyle>
+          <a:p>
+            <a:pPr lvl="1" algn="ctr"/>
+            <a:br>
+              <a:rPr lang="en-US" sz="1100">
+                <a:solidFill>
+                  <a:srgbClr val="C00000"/>
+                </a:solidFill>
+              </a:rPr>
+            </a:br>
+            <a:r>
+              <a:rPr lang="en-US" sz="1100">
+                <a:solidFill>
+                  <a:srgbClr val="C00000"/>
+                </a:solidFill>
+              </a:rPr>
+              <a:t>Laggards</a:t>
+            </a:r>
+          </a:p>
+        </p:txBody>
+      </p:sp>
+      <p:sp>
+        <p:nvSpPr>
+          <p:cNvPr id="15" name="Speech Bubble: Rectangle 14">
+            <a:extLst>
+              <a:ext uri="{FF2B5EF4-FFF2-40B4-BE49-F238E27FC236}">
+                <a16:creationId xmlns:a16="http://schemas.microsoft.com/office/drawing/2014/main" id="{B3110E24-0C24-4C99-A581-7C4797CCA5B5}"/>
+              </a:ext>
+            </a:extLst>
+          </p:cNvPr>
+          <p:cNvSpPr/>
+          <p:nvPr/>
+        </p:nvSpPr>
+        <p:spPr bwMode="gray">
+          <a:xfrm>
+            <a:off x="9062125" y="2457468"/>
+            <a:ext cx="1569775" cy="318607"/>
+          </a:xfrm>
+          <a:prstGeom prst="wedgeRectCallout">
+            <a:avLst>
+              <a:gd name="adj1" fmla="val -3932"/>
+              <a:gd name="adj2" fmla="val 256926"/>
+            </a:avLst>
+          </a:prstGeom>
+          <a:gradFill>
+            <a:gsLst>
+              <a:gs pos="0">
+                <a:schemeClr val="tx2">
+                  <a:lumMod val="20000"/>
+                  <a:lumOff val="80000"/>
+                  <a:alpha val="10000"/>
+                </a:schemeClr>
+              </a:gs>
+              <a:gs pos="100000">
+                <a:srgbClr val="C00000"/>
+              </a:gs>
+            </a:gsLst>
+            <a:lin ang="5400000" scaled="1"/>
+          </a:gradFill>
+          <a:ln w="12700">
+            <a:noFill/>
+          </a:ln>
+        </p:spPr>
+        <p:style>
+          <a:lnRef idx="2">
+            <a:schemeClr val="accent1">
+              <a:shade val="50000"/>
+            </a:schemeClr>
+          </a:lnRef>
+          <a:fillRef idx="1">
+            <a:schemeClr val="accent1"/>
+          </a:fillRef>
+          <a:effectRef idx="0">
+            <a:schemeClr val="accent1"/>
+          </a:effectRef>
+          <a:fontRef idx="minor">
+            <a:schemeClr val="lt1"/>
+          </a:fontRef>
+        </p:style>
+        <p:txBody>
+          <a:bodyPr rtlCol="0" anchor="ctr"/>
+          <a:lstStyle/>
+          <a:p>
+            <a:pPr algn="ctr">
+              <a:lnSpc>
+                <a:spcPct val="110000"/>
+              </a:lnSpc>
+            </a:pPr>
+            <a:r>
+              <a:rPr lang="en-US" sz="1200">
+                <a:solidFill>
+                  <a:srgbClr val="C00000"/>
+                </a:solidFill>
+              </a:rPr>
+              <a:t>Platform onboarding</a:t>
+            </a:r>
+          </a:p>
+        </p:txBody>
+      </p:sp>
+      <p:sp>
+        <p:nvSpPr>
+          <p:cNvPr id="16" name="Speech Bubble: Rectangle 15">
+            <a:extLst>
+              <a:ext uri="{FF2B5EF4-FFF2-40B4-BE49-F238E27FC236}">
+                <a16:creationId xmlns:a16="http://schemas.microsoft.com/office/drawing/2014/main" id="{D5B7A2B8-0DBE-4A18-9611-3B6931EBD2A7}"/>
+              </a:ext>
+            </a:extLst>
+          </p:cNvPr>
+          <p:cNvSpPr/>
+          <p:nvPr/>
+        </p:nvSpPr>
+        <p:spPr bwMode="gray">
+          <a:xfrm>
+            <a:off x="5643563" y="3417683"/>
+            <a:ext cx="2882848" cy="391066"/>
+          </a:xfrm>
+          <a:prstGeom prst="wedgeRectCallout">
+            <a:avLst>
+              <a:gd name="adj1" fmla="val 74475"/>
+              <a:gd name="adj2" fmla="val 100875"/>
+            </a:avLst>
+          </a:prstGeom>
+          <a:gradFill>
+            <a:gsLst>
+              <a:gs pos="0">
+                <a:schemeClr val="tx2">
+                  <a:lumMod val="20000"/>
+                  <a:lumOff val="80000"/>
+                  <a:alpha val="10000"/>
+                </a:schemeClr>
+              </a:gs>
+              <a:gs pos="100000">
+                <a:srgbClr val="C00000"/>
+              </a:gs>
+            </a:gsLst>
+            <a:lin ang="5400000" scaled="1"/>
+          </a:gradFill>
+          <a:ln w="12700">
+            <a:noFill/>
+          </a:ln>
+        </p:spPr>
+        <p:style>
+          <a:lnRef idx="2">
+            <a:schemeClr val="accent1">
+              <a:shade val="50000"/>
+            </a:schemeClr>
+          </a:lnRef>
+          <a:fillRef idx="1">
+            <a:schemeClr val="accent1"/>
+          </a:fillRef>
+          <a:effectRef idx="0">
+            <a:schemeClr val="accent1"/>
+          </a:effectRef>
+          <a:fontRef idx="minor">
+            <a:schemeClr val="lt1"/>
+          </a:fontRef>
+        </p:style>
+        <p:txBody>
+          <a:bodyPr rtlCol="0" anchor="ctr"/>
+          <a:lstStyle/>
+          <a:p>
+            <a:pPr algn="ctr">
+              <a:lnSpc>
+                <a:spcPct val="110000"/>
+              </a:lnSpc>
+            </a:pPr>
+            <a:r>
+              <a:rPr lang="en-US" sz="1200" dirty="0">
+                <a:solidFill>
+                  <a:srgbClr val="C00000"/>
+                </a:solidFill>
+              </a:rPr>
+              <a:t>Change verification and troubleshooting</a:t>
+            </a:r>
+          </a:p>
+        </p:txBody>
+      </p:sp>
+      <p:sp>
+        <p:nvSpPr>
+          <p:cNvPr id="17" name="Speech Bubble: Rectangle 16">
+            <a:extLst>
+              <a:ext uri="{FF2B5EF4-FFF2-40B4-BE49-F238E27FC236}">
+                <a16:creationId xmlns:a16="http://schemas.microsoft.com/office/drawing/2014/main" id="{2C799830-93E0-45C2-B5DE-811E31D6063E}"/>
+              </a:ext>
+            </a:extLst>
+          </p:cNvPr>
+          <p:cNvSpPr/>
+          <p:nvPr/>
+        </p:nvSpPr>
+        <p:spPr bwMode="gray">
+          <a:xfrm>
+            <a:off x="5476679" y="5218409"/>
+            <a:ext cx="1689296" cy="477664"/>
+          </a:xfrm>
+          <a:prstGeom prst="wedgeRectCallout">
+            <a:avLst>
+              <a:gd name="adj1" fmla="val 71465"/>
+              <a:gd name="adj2" fmla="val -36116"/>
+            </a:avLst>
+          </a:prstGeom>
+          <a:gradFill flip="none" rotWithShape="1">
+            <a:gsLst>
+              <a:gs pos="0">
+                <a:schemeClr val="tx2">
+                  <a:lumMod val="20000"/>
+                  <a:lumOff val="80000"/>
+                  <a:alpha val="10000"/>
+                </a:schemeClr>
+              </a:gs>
+              <a:gs pos="100000">
+                <a:srgbClr val="C00000"/>
+              </a:gs>
+            </a:gsLst>
+            <a:lin ang="0" scaled="1"/>
+            <a:tileRect/>
+          </a:gradFill>
+          <a:ln w="12700">
+            <a:noFill/>
+          </a:ln>
+        </p:spPr>
+        <p:style>
+          <a:lnRef idx="2">
+            <a:schemeClr val="accent1">
+              <a:shade val="50000"/>
+            </a:schemeClr>
+          </a:lnRef>
+          <a:fillRef idx="1">
+            <a:schemeClr val="accent1"/>
+          </a:fillRef>
+          <a:effectRef idx="0">
+            <a:schemeClr val="accent1"/>
+          </a:effectRef>
+          <a:fontRef idx="minor">
+            <a:schemeClr val="lt1"/>
+          </a:fontRef>
+        </p:style>
+        <p:txBody>
+          <a:bodyPr rtlCol="0" anchor="ctr"/>
+          <a:lstStyle/>
+          <a:p>
+            <a:pPr algn="ctr">
+              <a:lnSpc>
+                <a:spcPct val="110000"/>
+              </a:lnSpc>
+            </a:pPr>
+            <a:r>
+              <a:rPr lang="en-US" sz="1200" dirty="0">
+                <a:solidFill>
+                  <a:srgbClr val="C00000"/>
+                </a:solidFill>
+              </a:rPr>
+              <a:t>Capacity management and trend detection</a:t>
+            </a:r>
+          </a:p>
+        </p:txBody>
+      </p:sp>
+      <p:sp>
+        <p:nvSpPr>
+          <p:cNvPr id="18" name="Speech Bubble: Rectangle 17">
+            <a:extLst>
+              <a:ext uri="{FF2B5EF4-FFF2-40B4-BE49-F238E27FC236}">
+                <a16:creationId xmlns:a16="http://schemas.microsoft.com/office/drawing/2014/main" id="{04A0F6D6-79FD-4A70-AE66-E153F6B73739}"/>
+              </a:ext>
+            </a:extLst>
+          </p:cNvPr>
+          <p:cNvSpPr/>
+          <p:nvPr/>
+        </p:nvSpPr>
+        <p:spPr bwMode="gray">
+          <a:xfrm>
+            <a:off x="6396435" y="3913146"/>
+            <a:ext cx="1865743" cy="336389"/>
+          </a:xfrm>
+          <a:prstGeom prst="wedgeRectCallout">
+            <a:avLst>
+              <a:gd name="adj1" fmla="val 89224"/>
+              <a:gd name="adj2" fmla="val 72858"/>
+            </a:avLst>
+          </a:prstGeom>
+          <a:gradFill>
+            <a:gsLst>
+              <a:gs pos="0">
+                <a:schemeClr val="tx2">
+                  <a:lumMod val="20000"/>
+                  <a:lumOff val="80000"/>
+                  <a:alpha val="10000"/>
+                </a:schemeClr>
+              </a:gs>
+              <a:gs pos="100000">
+                <a:srgbClr val="C00000"/>
+              </a:gs>
+            </a:gsLst>
+            <a:lin ang="5400000" scaled="1"/>
+          </a:gradFill>
+          <a:ln w="12700">
+            <a:noFill/>
+          </a:ln>
+        </p:spPr>
+        <p:style>
+          <a:lnRef idx="2">
+            <a:schemeClr val="accent1">
+              <a:shade val="50000"/>
+            </a:schemeClr>
+          </a:lnRef>
+          <a:fillRef idx="1">
+            <a:schemeClr val="accent1"/>
+          </a:fillRef>
+          <a:effectRef idx="0">
+            <a:schemeClr val="accent1"/>
+          </a:effectRef>
+          <a:fontRef idx="minor">
+            <a:schemeClr val="lt1"/>
+          </a:fontRef>
+        </p:style>
+        <p:txBody>
+          <a:bodyPr rtlCol="0" anchor="ctr"/>
+          <a:lstStyle/>
+          <a:p>
+            <a:pPr algn="ctr">
+              <a:lnSpc>
+                <a:spcPct val="110000"/>
+              </a:lnSpc>
+            </a:pPr>
+            <a:r>
+              <a:rPr lang="en-US" sz="1200">
+                <a:solidFill>
+                  <a:srgbClr val="C00000"/>
+                </a:solidFill>
+              </a:rPr>
+              <a:t>Anomaly detection</a:t>
+            </a:r>
+          </a:p>
+        </p:txBody>
+      </p:sp>
+      <p:sp>
+        <p:nvSpPr>
+          <p:cNvPr id="19" name="Speech Bubble: Rectangle 18">
+            <a:extLst>
+              <a:ext uri="{FF2B5EF4-FFF2-40B4-BE49-F238E27FC236}">
+                <a16:creationId xmlns:a16="http://schemas.microsoft.com/office/drawing/2014/main" id="{77DFECE2-7387-4E11-9EF5-55DB1D783FB5}"/>
+              </a:ext>
+            </a:extLst>
+          </p:cNvPr>
+          <p:cNvSpPr/>
+          <p:nvPr/>
+        </p:nvSpPr>
+        <p:spPr bwMode="gray">
+          <a:xfrm>
+            <a:off x="7373122" y="2861746"/>
+            <a:ext cx="1865743" cy="477664"/>
+          </a:xfrm>
+          <a:prstGeom prst="wedgeRectCallout">
+            <a:avLst>
+              <a:gd name="adj1" fmla="val 64813"/>
+              <a:gd name="adj2" fmla="val 109150"/>
+            </a:avLst>
+          </a:prstGeom>
+          <a:gradFill>
+            <a:gsLst>
+              <a:gs pos="0">
+                <a:schemeClr val="tx2">
+                  <a:lumMod val="20000"/>
+                  <a:lumOff val="80000"/>
+                  <a:alpha val="10000"/>
+                </a:schemeClr>
+              </a:gs>
+              <a:gs pos="100000">
+                <a:srgbClr val="C00000"/>
+              </a:gs>
+            </a:gsLst>
+            <a:lin ang="5400000" scaled="1"/>
+          </a:gradFill>
+          <a:ln w="12700">
+            <a:noFill/>
+          </a:ln>
+        </p:spPr>
+        <p:style>
+          <a:lnRef idx="2">
+            <a:schemeClr val="accent1">
+              <a:shade val="50000"/>
+            </a:schemeClr>
+          </a:lnRef>
+          <a:fillRef idx="1">
+            <a:schemeClr val="accent1"/>
+          </a:fillRef>
+          <a:effectRef idx="0">
+            <a:schemeClr val="accent1"/>
+          </a:effectRef>
+          <a:fontRef idx="minor">
+            <a:schemeClr val="lt1"/>
+          </a:fontRef>
+        </p:style>
+        <p:txBody>
+          <a:bodyPr rtlCol="0" anchor="ctr"/>
+          <a:lstStyle/>
+          <a:p>
+            <a:pPr algn="ctr">
+              <a:lnSpc>
+                <a:spcPct val="110000"/>
+              </a:lnSpc>
+            </a:pPr>
+            <a:r>
+              <a:rPr lang="en-US" sz="1200">
+                <a:solidFill>
+                  <a:srgbClr val="C00000"/>
+                </a:solidFill>
+              </a:rPr>
+              <a:t>IETF vendor, operator and university colaboration</a:t>
+            </a:r>
+          </a:p>
+        </p:txBody>
+      </p:sp>
+      <p:sp>
+        <p:nvSpPr>
+          <p:cNvPr id="20" name="Speech Bubble: Rectangle 19">
+            <a:extLst>
+              <a:ext uri="{FF2B5EF4-FFF2-40B4-BE49-F238E27FC236}">
+                <a16:creationId xmlns:a16="http://schemas.microsoft.com/office/drawing/2014/main" id="{47D47C84-78F5-4035-82EC-1E368EFC58D5}"/>
+              </a:ext>
+            </a:extLst>
+          </p:cNvPr>
+          <p:cNvSpPr/>
+          <p:nvPr/>
+        </p:nvSpPr>
+        <p:spPr bwMode="gray">
+          <a:xfrm>
+            <a:off x="6097672" y="4718134"/>
+            <a:ext cx="1635786" cy="358523"/>
+          </a:xfrm>
+          <a:prstGeom prst="wedgeRectCallout">
+            <a:avLst>
+              <a:gd name="adj1" fmla="val 95861"/>
+              <a:gd name="adj2" fmla="val 71210"/>
+            </a:avLst>
+          </a:prstGeom>
+          <a:gradFill>
+            <a:gsLst>
+              <a:gs pos="0">
+                <a:schemeClr val="tx2">
+                  <a:lumMod val="20000"/>
+                  <a:lumOff val="80000"/>
+                  <a:alpha val="10000"/>
+                </a:schemeClr>
+              </a:gs>
+              <a:gs pos="100000">
+                <a:srgbClr val="C00000"/>
+              </a:gs>
+            </a:gsLst>
+            <a:lin ang="5400000" scaled="1"/>
+          </a:gradFill>
+          <a:ln w="12700">
+            <a:noFill/>
+          </a:ln>
+        </p:spPr>
+        <p:style>
+          <a:lnRef idx="2">
+            <a:schemeClr val="accent1">
+              <a:shade val="50000"/>
+            </a:schemeClr>
+          </a:lnRef>
+          <a:fillRef idx="1">
+            <a:schemeClr val="accent1"/>
+          </a:fillRef>
+          <a:effectRef idx="0">
+            <a:schemeClr val="accent1"/>
+          </a:effectRef>
+          <a:fontRef idx="minor">
+            <a:schemeClr val="lt1"/>
+          </a:fontRef>
+        </p:style>
+        <p:txBody>
+          <a:bodyPr rtlCol="0" anchor="ctr"/>
+          <a:lstStyle/>
+          <a:p>
+            <a:pPr algn="ctr">
+              <a:lnSpc>
+                <a:spcPct val="110000"/>
+              </a:lnSpc>
+            </a:pPr>
+            <a:r>
+              <a:rPr lang="en-US" sz="1200" dirty="0">
+                <a:solidFill>
+                  <a:srgbClr val="C00000"/>
+                </a:solidFill>
+              </a:rPr>
+              <a:t>Network visualization</a:t>
+            </a:r>
+          </a:p>
+        </p:txBody>
+      </p:sp>
+      <p:pic>
+        <p:nvPicPr>
+          <p:cNvPr id="21" name="Grafik 185">
+            <a:extLst>
+              <a:ext uri="{FF2B5EF4-FFF2-40B4-BE49-F238E27FC236}">
+                <a16:creationId xmlns:a16="http://schemas.microsoft.com/office/drawing/2014/main" id="{D06B0BCF-1F63-425B-9A75-4E508B34DCB5}"/>
+              </a:ext>
+            </a:extLst>
+          </p:cNvPr>
+          <p:cNvPicPr>
+            <a:picLocks noChangeAspect="1"/>
+          </p:cNvPicPr>
+          <p:nvPr/>
+        </p:nvPicPr>
+        <p:blipFill>
+          <a:blip r:embed="rId3">
+            <a:extLst>
+              <a:ext uri="{28A0092B-C50C-407E-A947-70E740481C1C}">
+                <a14:useLocalDpi xmlns:a14="http://schemas.microsoft.com/office/drawing/2010/main" val="0"/>
+              </a:ext>
+              <a:ext uri="{96DAC541-7B7A-43D3-8B79-37D633B846F1}">
+                <asvg:svgBlip xmlns:asvg="http://schemas.microsoft.com/office/drawing/2016/SVG/main" r:embed="rId4"/>
+              </a:ext>
+            </a:extLst>
+          </a:blip>
+          <a:stretch>
+            <a:fillRect/>
+          </a:stretch>
+        </p:blipFill>
+        <p:spPr>
+          <a:xfrm>
+            <a:off x="9329682" y="4540488"/>
+            <a:ext cx="409069" cy="409069"/>
+          </a:xfrm>
+          <a:prstGeom prst="rect">
+            <a:avLst/>
+          </a:prstGeom>
+        </p:spPr>
+      </p:pic>
+      <p:pic>
+        <p:nvPicPr>
+          <p:cNvPr id="22" name="Grafik 317">
+            <a:extLst>
+              <a:ext uri="{FF2B5EF4-FFF2-40B4-BE49-F238E27FC236}">
+                <a16:creationId xmlns:a16="http://schemas.microsoft.com/office/drawing/2014/main" id="{E8E49403-B152-4F6C-891A-544BC8B56B0C}"/>
+              </a:ext>
+            </a:extLst>
+          </p:cNvPr>
+          <p:cNvPicPr>
+            <a:picLocks noChangeAspect="1"/>
+          </p:cNvPicPr>
+          <p:nvPr/>
+        </p:nvPicPr>
+        <p:blipFill>
+          <a:blip r:embed="rId5">
+            <a:extLst>
+              <a:ext uri="{28A0092B-C50C-407E-A947-70E740481C1C}">
+                <a14:useLocalDpi xmlns:a14="http://schemas.microsoft.com/office/drawing/2010/main" val="0"/>
+              </a:ext>
+              <a:ext uri="{96DAC541-7B7A-43D3-8B79-37D633B846F1}">
+                <asvg:svgBlip xmlns:asvg="http://schemas.microsoft.com/office/drawing/2016/SVG/main" r:embed="rId6"/>
+              </a:ext>
+            </a:extLst>
+          </a:blip>
+          <a:stretch>
+            <a:fillRect/>
+          </a:stretch>
+        </p:blipFill>
+        <p:spPr>
+          <a:xfrm>
+            <a:off x="8794949" y="4576915"/>
+            <a:ext cx="409069" cy="409069"/>
+          </a:xfrm>
+          <a:prstGeom prst="rect">
+            <a:avLst/>
+          </a:prstGeom>
+        </p:spPr>
+      </p:pic>
+      <p:pic>
+        <p:nvPicPr>
+          <p:cNvPr id="23" name="Grafik 8">
+            <a:extLst>
+              <a:ext uri="{FF2B5EF4-FFF2-40B4-BE49-F238E27FC236}">
+                <a16:creationId xmlns:a16="http://schemas.microsoft.com/office/drawing/2014/main" id="{80C9B0E7-FC19-48AA-BBDE-FDF58F4ACB88}"/>
+              </a:ext>
+            </a:extLst>
+          </p:cNvPr>
+          <p:cNvPicPr>
+            <a:picLocks noChangeAspect="1"/>
+          </p:cNvPicPr>
+          <p:nvPr/>
+        </p:nvPicPr>
+        <p:blipFill>
+          <a:blip r:embed="rId7">
+            <a:extLst>
+              <a:ext uri="{28A0092B-C50C-407E-A947-70E740481C1C}">
+                <a14:useLocalDpi xmlns:a14="http://schemas.microsoft.com/office/drawing/2010/main" val="0"/>
+              </a:ext>
+              <a:ext uri="{96DAC541-7B7A-43D3-8B79-37D633B846F1}">
+                <asvg:svgBlip xmlns:asvg="http://schemas.microsoft.com/office/drawing/2016/SVG/main" r:embed="rId8"/>
+              </a:ext>
+            </a:extLst>
+          </a:blip>
+          <a:stretch>
+            <a:fillRect/>
+          </a:stretch>
+        </p:blipFill>
+        <p:spPr>
+          <a:xfrm>
+            <a:off x="10482095" y="4583876"/>
+            <a:ext cx="409069" cy="409069"/>
+          </a:xfrm>
+          <a:prstGeom prst="rect">
+            <a:avLst/>
+          </a:prstGeom>
+        </p:spPr>
+      </p:pic>
+      <p:pic>
+        <p:nvPicPr>
+          <p:cNvPr id="24" name="Graphic 23">
+            <a:extLst>
+              <a:ext uri="{FF2B5EF4-FFF2-40B4-BE49-F238E27FC236}">
+                <a16:creationId xmlns:a16="http://schemas.microsoft.com/office/drawing/2014/main" id="{E91AACE7-2683-4856-8C28-9770EF72021F}"/>
+              </a:ext>
+            </a:extLst>
+          </p:cNvPr>
+          <p:cNvPicPr>
+            <a:picLocks noChangeAspect="1"/>
+          </p:cNvPicPr>
+          <p:nvPr/>
+        </p:nvPicPr>
+        <p:blipFill>
+          <a:blip r:embed="rId9">
+            <a:extLst>
+              <a:ext uri="{28A0092B-C50C-407E-A947-70E740481C1C}">
+                <a14:useLocalDpi xmlns:a14="http://schemas.microsoft.com/office/drawing/2010/main" val="0"/>
+              </a:ext>
+              <a:ext uri="{96DAC541-7B7A-43D3-8B79-37D633B846F1}">
+                <asvg:svgBlip xmlns:asvg="http://schemas.microsoft.com/office/drawing/2016/SVG/main" r:embed="rId10"/>
+              </a:ext>
+            </a:extLst>
+          </a:blip>
+          <a:stretch>
+            <a:fillRect/>
+          </a:stretch>
+        </p:blipFill>
+        <p:spPr>
+          <a:xfrm>
+            <a:off x="9951026" y="4529699"/>
+            <a:ext cx="410400" cy="410400"/>
+          </a:xfrm>
+          <a:prstGeom prst="rect">
+            <a:avLst/>
+          </a:prstGeom>
+        </p:spPr>
+      </p:pic>
+      <p:sp>
+        <p:nvSpPr>
+          <p:cNvPr id="25" name="Speech Bubble: Rectangle 24">
+            <a:extLst>
+              <a:ext uri="{FF2B5EF4-FFF2-40B4-BE49-F238E27FC236}">
+                <a16:creationId xmlns:a16="http://schemas.microsoft.com/office/drawing/2014/main" id="{18BF4E2A-FA22-4171-BB28-F63F1819D0D8}"/>
+              </a:ext>
+            </a:extLst>
+          </p:cNvPr>
+          <p:cNvSpPr/>
+          <p:nvPr/>
+        </p:nvSpPr>
+        <p:spPr bwMode="gray">
+          <a:xfrm>
+            <a:off x="6266037" y="4335801"/>
+            <a:ext cx="1865743" cy="336389"/>
+          </a:xfrm>
+          <a:prstGeom prst="wedgeRectCallout">
+            <a:avLst>
+              <a:gd name="adj1" fmla="val 84119"/>
+              <a:gd name="adj2" fmla="val 84184"/>
+            </a:avLst>
+          </a:prstGeom>
+          <a:gradFill>
+            <a:gsLst>
+              <a:gs pos="0">
+                <a:schemeClr val="tx2">
+                  <a:lumMod val="20000"/>
+                  <a:lumOff val="80000"/>
+                  <a:alpha val="10000"/>
+                </a:schemeClr>
+              </a:gs>
+              <a:gs pos="100000">
+                <a:srgbClr val="C00000"/>
+              </a:gs>
+            </a:gsLst>
+            <a:lin ang="5400000" scaled="1"/>
+          </a:gradFill>
+          <a:ln w="12700">
+            <a:noFill/>
+          </a:ln>
+        </p:spPr>
+        <p:style>
+          <a:lnRef idx="2">
+            <a:schemeClr val="accent1">
+              <a:shade val="50000"/>
+            </a:schemeClr>
+          </a:lnRef>
+          <a:fillRef idx="1">
+            <a:schemeClr val="accent1"/>
+          </a:fillRef>
+          <a:effectRef idx="0">
+            <a:schemeClr val="accent1"/>
+          </a:effectRef>
+          <a:fontRef idx="minor">
+            <a:schemeClr val="lt1"/>
+          </a:fontRef>
+        </p:style>
+        <p:txBody>
+          <a:bodyPr rtlCol="0" anchor="ctr"/>
+          <a:lstStyle/>
+          <a:p>
+            <a:pPr algn="ctr">
+              <a:lnSpc>
+                <a:spcPct val="110000"/>
+              </a:lnSpc>
+            </a:pPr>
+            <a:r>
+              <a:rPr lang="en-US" sz="1200" dirty="0">
+                <a:solidFill>
+                  <a:srgbClr val="C00000"/>
+                </a:solidFill>
+              </a:rPr>
+              <a:t>SLO Reporting</a:t>
+            </a:r>
           </a:p>
         </p:txBody>
       </p:sp>
@@ -5664,15 +7668,79 @@
         </p:nvSpPr>
         <p:spPr>
           <a:xfrm>
-            <a:off x="6259484" y="1690688"/>
-            <a:ext cx="5494712" cy="4683795"/>
+            <a:off x="6278253" y="1690688"/>
+            <a:ext cx="5684362" cy="4917502"/>
           </a:xfrm>
         </p:spPr>
         <p:txBody>
           <a:bodyPr>
-            <a:noAutofit/>
+            <a:normAutofit lnSpcReduction="10000"/>
           </a:bodyPr>
           <a:lstStyle/>
+          <a:p>
+            <a:pPr marL="285750" indent="-285750">
+              <a:spcBef>
+                <a:spcPts val="300"/>
+              </a:spcBef>
+              <a:spcAft>
+                <a:spcPts val="300"/>
+              </a:spcAft>
+            </a:pPr>
+            <a:r>
+              <a:rPr lang="en-US" sz="1700" dirty="0"/>
+              <a:t>IPFIX defines two key data engineering tools to reduce collected and exported amount of data. </a:t>
+            </a:r>
+            <a:r>
+              <a:rPr lang="en-US" sz="1700" b="1" dirty="0"/>
+              <a:t>Sampling and Aggregation. </a:t>
+            </a:r>
+            <a:r>
+              <a:rPr lang="en-US" sz="1700" dirty="0"/>
+              <a:t>Enabling </a:t>
+            </a:r>
+            <a:r>
+              <a:rPr lang="en-US" sz="1700" b="1" dirty="0"/>
+              <a:t>a statistical view from the network usage. </a:t>
+            </a:r>
+            <a:r>
+              <a:rPr lang="en-US" sz="1700" dirty="0"/>
+              <a:t>Also called </a:t>
+            </a:r>
+            <a:r>
+              <a:rPr lang="en-US" sz="1700" b="1" dirty="0"/>
+              <a:t>connectivity matrix.</a:t>
+            </a:r>
+          </a:p>
+          <a:p>
+            <a:pPr marL="285750" indent="-285750">
+              <a:spcBef>
+                <a:spcPts val="300"/>
+              </a:spcBef>
+              <a:spcAft>
+                <a:spcPts val="300"/>
+              </a:spcAft>
+            </a:pPr>
+            <a:r>
+              <a:rPr lang="en-US" sz="1700" dirty="0"/>
+              <a:t>IPFIX </a:t>
+            </a:r>
+            <a:r>
+              <a:rPr lang="en-US" sz="1700" b="1" dirty="0"/>
+              <a:t>measures packets and bytes </a:t>
+            </a:r>
+            <a:r>
+              <a:rPr lang="en-US" sz="1700" dirty="0"/>
+              <a:t>and give </a:t>
+            </a:r>
+            <a:r>
+              <a:rPr lang="en-US" sz="1700" b="1" dirty="0"/>
+              <a:t>device and control-plane context</a:t>
+            </a:r>
+            <a:r>
+              <a:rPr lang="en-US" sz="1700" dirty="0"/>
+              <a:t>. </a:t>
+            </a:r>
+          </a:p>
           <a:p>
             <a:pPr marL="285750" indent="-285750">
               <a:spcBef>
@@ -5685,12 +7753,110 @@
               <a:buChar char="•"/>
             </a:pPr>
             <a:r>
+              <a:rPr lang="en-US" sz="1700" b="1" dirty="0"/>
+              <a:t>With </a:t>
+            </a:r>
+            <a:r>
+              <a:rPr lang="en-US" sz="1700" b="1" dirty="0" err="1"/>
+              <a:t>Inband</a:t>
+            </a:r>
+            <a:r>
+              <a:rPr lang="en-US" sz="1700" b="1" dirty="0"/>
+              <a:t> Telemetry</a:t>
+            </a:r>
+            <a:r>
               <a:rPr lang="en-US" sz="1700" dirty="0"/>
-              <a:t>Packets are captured ingress with an optional sampler, data-plane dimensions extracted, enriched with device and control-plane dimensions and </a:t>
+              <a:t>, </a:t>
+            </a:r>
+            <a:r>
+              <a:rPr lang="en-US" sz="1700" dirty="0" err="1"/>
+              <a:t>iOAM</a:t>
+            </a:r>
+            <a:r>
+              <a:rPr lang="en-US" sz="1700" dirty="0"/>
+              <a:t>, Path Tracing and </a:t>
+            </a:r>
+            <a:r>
+              <a:rPr lang="en-US" sz="1700" dirty="0" err="1"/>
+              <a:t>iFIT</a:t>
+            </a:r>
+            <a:r>
+              <a:rPr lang="en-US" sz="1700" dirty="0"/>
+              <a:t>, </a:t>
             </a:r>
             <a:r>
               <a:rPr lang="en-US" sz="1700" b="1" dirty="0"/>
-              <a:t>added with a unique flow ID to a flow cache on the node for aggregation.</a:t>
+              <a:t>delay can be measured </a:t>
+            </a:r>
+            <a:r>
+              <a:rPr lang="en-US" sz="1700" dirty="0"/>
+              <a:t>actively (probing) or passively. Metrics are exposed on every node, postcards or only at the last node (passport).</a:t>
+            </a:r>
+          </a:p>
+          <a:p>
+            <a:pPr marL="285750" indent="-285750">
+              <a:spcBef>
+                <a:spcPts val="300"/>
+              </a:spcBef>
+              <a:spcAft>
+                <a:spcPts val="300"/>
+              </a:spcAft>
+            </a:pPr>
+            <a:r>
+              <a:rPr lang="de-CH" sz="1700" b="1" dirty="0"/>
+              <a:t>IPFIX </a:t>
+            </a:r>
+            <a:r>
+              <a:rPr lang="de-CH" sz="1700" b="1" dirty="0" err="1"/>
+              <a:t>lacks</a:t>
+            </a:r>
+            <a:r>
+              <a:rPr lang="de-CH" sz="1700" b="1" dirty="0"/>
+              <a:t> </a:t>
+            </a:r>
+            <a:r>
+              <a:rPr lang="de-CH" sz="1700" b="1" dirty="0" err="1"/>
+              <a:t>the</a:t>
+            </a:r>
+            <a:r>
+              <a:rPr lang="de-CH" sz="1700" b="1" dirty="0"/>
+              <a:t> </a:t>
+            </a:r>
+            <a:r>
+              <a:rPr lang="de-CH" sz="1700" b="1" dirty="0" err="1"/>
+              <a:t>ability</a:t>
+            </a:r>
+            <a:r>
+              <a:rPr lang="de-CH" sz="1700" b="1" dirty="0"/>
+              <a:t> </a:t>
+            </a:r>
+            <a:r>
+              <a:rPr lang="de-CH" sz="1700" b="1" dirty="0" err="1"/>
+              <a:t>to</a:t>
+            </a:r>
+            <a:r>
+              <a:rPr lang="de-CH" sz="1700" b="1" dirty="0"/>
+              <a:t> </a:t>
+            </a:r>
+            <a:r>
+              <a:rPr lang="de-CH" sz="1700" b="1" dirty="0" err="1"/>
+              <a:t>export</a:t>
+            </a:r>
+            <a:r>
+              <a:rPr lang="de-CH" sz="1700" b="1" dirty="0"/>
+              <a:t> </a:t>
+            </a:r>
+            <a:r>
+              <a:rPr lang="de-CH" sz="1700" b="1" dirty="0" err="1"/>
+              <a:t>delay</a:t>
+            </a:r>
+            <a:r>
+              <a:rPr lang="en-US" sz="1700" b="1" dirty="0"/>
+              <a:t>. </a:t>
+            </a:r>
+            <a:r>
+              <a:rPr lang="en-US" sz="1700" dirty="0"/>
+              <a:t>A key element for monitoring Customer Service Level Agreements.</a:t>
             </a:r>
           </a:p>
           <a:p>
@@ -5705,32 +7871,32 @@
               <a:buChar char="•"/>
             </a:pPr>
             <a:r>
+              <a:rPr lang="en-US" sz="1700" b="1" dirty="0" err="1"/>
+              <a:t>Inband</a:t>
+            </a:r>
+            <a:r>
+              <a:rPr lang="en-US" sz="1700" b="1" dirty="0"/>
+              <a:t> Telemetry lacks Flow Aggregation support </a:t>
+            </a:r>
+            <a:r>
               <a:rPr lang="en-US" sz="1700" dirty="0"/>
-              <a:t>The data-plane dimensions answers </a:t>
+              <a:t>as defined in RFC 7015. Therefore, </a:t>
             </a:r>
             <a:r>
               <a:rPr lang="en-US" sz="1700" b="1" dirty="0"/>
-              <a:t>which packet</a:t>
+              <a:t>scalability</a:t>
             </a:r>
             <a:r>
               <a:rPr lang="en-US" sz="1700" dirty="0"/>
-              <a:t>. The control-plane </a:t>
+              <a:t> in terms of data export and collection is </a:t>
             </a:r>
             <a:r>
               <a:rPr lang="en-US" sz="1700" b="1" dirty="0"/>
-              <a:t>which service</a:t>
+              <a:t>drastically limited </a:t>
             </a:r>
             <a:r>
               <a:rPr lang="en-US" sz="1700" dirty="0"/>
-              <a:t>. The device dimensions </a:t>
-            </a:r>
-            <a:r>
-              <a:rPr lang="en-US" sz="1700" b="1" dirty="0"/>
-              <a:t>where in the network</a:t>
-            </a:r>
-            <a:r>
-              <a:rPr lang="en-US" sz="1700" dirty="0"/>
-              <a:t>.</a:t>
+              <a:t>today.</a:t>
             </a:r>
           </a:p>
           <a:p>
@@ -5745,142 +7911,48 @@
               <a:buChar char="•"/>
             </a:pPr>
             <a:r>
-              <a:rPr lang="de-CH" sz="1700" dirty="0">
-                <a:solidFill>
-                  <a:srgbClr val="FF0000"/>
-                </a:solidFill>
-              </a:rPr>
-              <a:t>In </a:t>
-            </a:r>
-            <a:r>
-              <a:rPr lang="de-CH" sz="1700" dirty="0" err="1">
-                <a:solidFill>
-                  <a:srgbClr val="FF0000"/>
-                </a:solidFill>
-              </a:rPr>
-              <a:t>case</a:t>
-            </a:r>
-            <a:r>
-              <a:rPr lang="de-CH" sz="1700" dirty="0">
-                <a:solidFill>
-                  <a:srgbClr val="FF0000"/>
-                </a:solidFill>
-              </a:rPr>
-              <a:t> of </a:t>
-            </a:r>
-            <a:r>
-              <a:rPr lang="de-CH" sz="1700" dirty="0" err="1">
-                <a:solidFill>
-                  <a:srgbClr val="FF0000"/>
-                </a:solidFill>
-              </a:rPr>
+              <a:rPr lang="en-US" sz="1700" dirty="0"/>
+              <a:t>draft-</a:t>
+            </a:r>
+            <a:r>
+              <a:rPr lang="en-US" sz="1700" dirty="0" err="1"/>
+              <a:t>tgraf</a:t>
+            </a:r>
+            <a:r>
+              <a:rPr lang="en-US" sz="1700" dirty="0"/>
+              <a:t>-opsawg-</a:t>
+            </a:r>
+            <a:r>
+              <a:rPr lang="en-US" sz="1700" dirty="0" err="1"/>
+              <a:t>ipfix</a:t>
+            </a:r>
+            <a:r>
+              <a:rPr lang="en-US" sz="1700" dirty="0"/>
+              <a:t>-</a:t>
+            </a:r>
+            <a:r>
+              <a:rPr lang="en-US" sz="1700" dirty="0" err="1"/>
+              <a:t>inband</a:t>
+            </a:r>
+            <a:r>
+              <a:rPr lang="en-US" sz="1700" dirty="0"/>
+              <a:t>-telemetry enables IPFIX to export delay while preserving the ability to aggregate and also </a:t>
+            </a:r>
+            <a:r>
+              <a:rPr lang="en-US" sz="1700" b="1" dirty="0"/>
+              <a:t>adds the </a:t>
+            </a:r>
+            <a:r>
+              <a:rPr lang="en-US" sz="1700" b="1" dirty="0" err="1"/>
               <a:t>Inband</a:t>
             </a:r>
             <a:r>
-              <a:rPr lang="de-CH" sz="1700" dirty="0">
-                <a:solidFill>
-                  <a:srgbClr val="FF0000"/>
-                </a:solidFill>
-              </a:rPr>
-              <a:t> Telemetry, </a:t>
-            </a:r>
-            <a:r>
               <a:rPr lang="en-US" sz="1700" b="1" dirty="0"/>
-              <a:t>a timestamp and optionally a direct export tag is added </a:t>
+              <a:t> Telemetry path delay metric definition</a:t>
             </a:r>
             <a:r>
               <a:rPr lang="en-US" sz="1700" dirty="0"/>
-              <a:t>to the packet header when entering the </a:t>
-            </a:r>
-            <a:r>
-              <a:rPr lang="en-US" sz="1700" dirty="0" err="1"/>
-              <a:t>Inband</a:t>
-            </a:r>
-            <a:r>
-              <a:rPr lang="en-US" sz="1700" dirty="0"/>
-              <a:t> Telemetry domain.</a:t>
-            </a:r>
-          </a:p>
-          <a:p>
-            <a:pPr marL="285750" indent="-285750">
-              <a:spcBef>
-                <a:spcPts val="300"/>
-              </a:spcBef>
-              <a:spcAft>
-                <a:spcPts val="300"/>
-              </a:spcAft>
-              <a:buFont typeface="Arial" panose="020B0604020202020204" pitchFamily="34" charset="0"/>
-              <a:buChar char="•"/>
-            </a:pPr>
-            <a:r>
-              <a:rPr lang="en-US" sz="1700" dirty="0"/>
-              <a:t>Each subsequent packet for the same flow increases byte and packet count. Each new flow creates a new flow ID in the flow cache.</a:t>
-            </a:r>
-          </a:p>
-          <a:p>
-            <a:pPr marL="285750" indent="-285750">
-              <a:spcBef>
-                <a:spcPts val="300"/>
-              </a:spcBef>
-              <a:spcAft>
-                <a:spcPts val="300"/>
-              </a:spcAft>
-            </a:pPr>
-            <a:r>
-              <a:rPr lang="de-CH" sz="1700" dirty="0">
-                <a:solidFill>
-                  <a:srgbClr val="FF0000"/>
-                </a:solidFill>
-              </a:rPr>
-              <a:t>In </a:t>
-            </a:r>
-            <a:r>
-              <a:rPr lang="de-CH" sz="1700" dirty="0" err="1">
-                <a:solidFill>
-                  <a:srgbClr val="FF0000"/>
-                </a:solidFill>
-              </a:rPr>
-              <a:t>case</a:t>
-            </a:r>
-            <a:r>
-              <a:rPr lang="de-CH" sz="1700" dirty="0">
-                <a:solidFill>
-                  <a:srgbClr val="FF0000"/>
-                </a:solidFill>
-              </a:rPr>
-              <a:t> of </a:t>
-            </a:r>
-            <a:r>
-              <a:rPr lang="de-CH" sz="1700" dirty="0" err="1">
-                <a:solidFill>
-                  <a:srgbClr val="FF0000"/>
-                </a:solidFill>
-              </a:rPr>
-              <a:t>Inband</a:t>
-            </a:r>
-            <a:r>
-              <a:rPr lang="de-CH" sz="1700" dirty="0">
-                <a:solidFill>
-                  <a:srgbClr val="FF0000"/>
-                </a:solidFill>
-              </a:rPr>
-              <a:t> Telemetry, </a:t>
-            </a:r>
-            <a:r>
-              <a:rPr lang="en-US" sz="1700" dirty="0"/>
-              <a:t>At each node in transit (postcard) or only at the last node (passport), </a:t>
-            </a:r>
-            <a:r>
-              <a:rPr lang="en-US" sz="1700" b="1" dirty="0"/>
-              <a:t>the delay is calculated by comparing the timestamp in the packet and when packet is received </a:t>
-            </a:r>
-            <a:r>
-              <a:rPr lang="en-US" sz="1700" dirty="0"/>
-              <a:t>on the node</a:t>
-            </a:r>
-            <a:r>
-              <a:rPr lang="en-US" sz="1700" b="1" dirty="0"/>
-              <a:t>. Delay is populated into the flow cache besides packet and byte count.</a:t>
+              <a:t> in the performance registry for proper delay definition.</a:t>
             </a:r>
           </a:p>
         </p:txBody>
@@ -5890,7 +7962,7 @@
           <p:cNvPr id="5" name="Picture 4">
             <a:extLst>
               <a:ext uri="{FF2B5EF4-FFF2-40B4-BE49-F238E27FC236}">
-                <a16:creationId xmlns:a16="http://schemas.microsoft.com/office/drawing/2014/main" id="{EA3944B9-0180-4946-A0EF-FB3A1E94D8EE}"/>
+                <a16:creationId xmlns:a16="http://schemas.microsoft.com/office/drawing/2014/main" id="{17C555EC-7097-40D7-9353-664AF0ED39D5}"/>
               </a:ext>
             </a:extLst>
           </p:cNvPr>
@@ -5900,15 +7972,15 @@
           <p:nvPr/>
         </p:nvPicPr>
         <p:blipFill>
-          <a:blip r:embed="rId2"/>
+          <a:blip r:embed="rId3"/>
           <a:stretch>
             <a:fillRect/>
           </a:stretch>
         </p:blipFill>
         <p:spPr>
           <a:xfrm>
-            <a:off x="936590" y="1690688"/>
-            <a:ext cx="4885090" cy="4683795"/>
+            <a:off x="1199456" y="1805062"/>
+            <a:ext cx="4552951" cy="4720282"/>
           </a:xfrm>
           <a:prstGeom prst="rect">
             <a:avLst/>
@@ -5917,10 +7989,10 @@
       </p:pic>
       <p:sp>
         <p:nvSpPr>
-          <p:cNvPr id="7" name="Title 1">
-            <a:extLst>
-              <a:ext uri="{FF2B5EF4-FFF2-40B4-BE49-F238E27FC236}">
-                <a16:creationId xmlns:a16="http://schemas.microsoft.com/office/drawing/2014/main" id="{0CDE59DD-77FD-4C84-B32D-07354C792469}"/>
+          <p:cNvPr id="8" name="Title 1">
+            <a:extLst>
+              <a:ext uri="{FF2B5EF4-FFF2-40B4-BE49-F238E27FC236}">
+                <a16:creationId xmlns:a16="http://schemas.microsoft.com/office/drawing/2014/main" id="{C173E561-BB7B-4538-A147-1F4401F1B1C7}"/>
               </a:ext>
             </a:extLst>
           </p:cNvPr>
@@ -5963,29 +8035,40 @@
           </a:lstStyle>
           <a:p>
             <a:r>
+              <a:rPr lang="en-US" sz="3100" b="1" dirty="0" err="1"/>
+              <a:t>Inband</a:t>
+            </a:r>
+            <a:r>
               <a:rPr lang="en-US" sz="3100" b="1" dirty="0"/>
-              <a:t>Measure delay and give network context</a:t>
+              <a:t> Telemetry with IPFIX Flow-Aggregation</a:t>
             </a:r>
             <a:br>
-              <a:rPr lang="en-GB" sz="3200" dirty="0"/>
+              <a:rPr lang="en-GB" sz="2800" dirty="0"/>
             </a:br>
             <a:r>
-              <a:rPr lang="en-US" sz="2700" dirty="0">
-                <a:solidFill>
-                  <a:schemeClr val="bg2">
-                    <a:lumMod val="75000"/>
+              <a:rPr lang="en-US" sz="2700" b="0" dirty="0">
+                <a:solidFill>
+                  <a:schemeClr val="bg1">
+                    <a:lumMod val="65000"/>
                   </a:schemeClr>
                 </a:solidFill>
               </a:rPr>
-              <a:t>Enabling a statistical network delay view</a:t>
-            </a:r>
+              <a:t>Aggregate and sample as early as possible – Chose your Cardinality</a:t>
+            </a:r>
+            <a:endParaRPr lang="en-US" sz="2700" dirty="0">
+              <a:solidFill>
+                <a:schemeClr val="bg2">
+                  <a:lumMod val="75000"/>
+                </a:schemeClr>
+              </a:solidFill>
+            </a:endParaRPr>
           </a:p>
         </p:txBody>
       </p:sp>
     </p:spTree>
     <p:extLst>
       <p:ext uri="{BB962C8B-B14F-4D97-AF65-F5344CB8AC3E}">
-        <p14:creationId xmlns:p14="http://schemas.microsoft.com/office/powerpoint/2010/main" val="3756297821"/>
+        <p14:creationId xmlns:p14="http://schemas.microsoft.com/office/powerpoint/2010/main" val="731853391"/>
       </p:ext>
     </p:extLst>
   </p:cSld>
@@ -6012,12 +8095,251 @@
           <a:chExt cx="0" cy="0"/>
         </a:xfrm>
       </p:grpSpPr>
+      <p:sp>
+        <p:nvSpPr>
+          <p:cNvPr id="4" name="Content Placeholder 1">
+            <a:extLst>
+              <a:ext uri="{FF2B5EF4-FFF2-40B4-BE49-F238E27FC236}">
+                <a16:creationId xmlns:a16="http://schemas.microsoft.com/office/drawing/2014/main" id="{B96F8F06-524F-4D7C-89FB-72456175BADD}"/>
+              </a:ext>
+            </a:extLst>
+          </p:cNvPr>
+          <p:cNvSpPr>
+            <a:spLocks noGrp="1"/>
+          </p:cNvSpPr>
+          <p:nvPr>
+            <p:ph idx="1"/>
+          </p:nvPr>
+        </p:nvSpPr>
+        <p:spPr>
+          <a:xfrm>
+            <a:off x="6259484" y="1690688"/>
+            <a:ext cx="5494712" cy="4683795"/>
+          </a:xfrm>
+        </p:spPr>
+        <p:txBody>
+          <a:bodyPr>
+            <a:noAutofit/>
+          </a:bodyPr>
+          <a:lstStyle/>
+          <a:p>
+            <a:pPr marL="285750" indent="-285750">
+              <a:spcBef>
+                <a:spcPts val="300"/>
+              </a:spcBef>
+              <a:spcAft>
+                <a:spcPts val="300"/>
+              </a:spcAft>
+              <a:buFont typeface="Arial" panose="020B0604020202020204" pitchFamily="34" charset="0"/>
+              <a:buChar char="•"/>
+            </a:pPr>
+            <a:r>
+              <a:rPr lang="en-US" sz="1700" dirty="0"/>
+              <a:t>Packets are captured ingress with an optional sampler, data-plane dimensions extracted, enriched with device and control-plane dimensions and </a:t>
+            </a:r>
+            <a:r>
+              <a:rPr lang="en-US" sz="1700" b="1" dirty="0"/>
+              <a:t>added with a unique flow ID to a flow cache on the node for aggregation.</a:t>
+            </a:r>
+          </a:p>
+          <a:p>
+            <a:pPr marL="285750" indent="-285750">
+              <a:spcBef>
+                <a:spcPts val="300"/>
+              </a:spcBef>
+              <a:spcAft>
+                <a:spcPts val="300"/>
+              </a:spcAft>
+              <a:buFont typeface="Arial" panose="020B0604020202020204" pitchFamily="34" charset="0"/>
+              <a:buChar char="•"/>
+            </a:pPr>
+            <a:r>
+              <a:rPr lang="en-US" sz="1700" dirty="0"/>
+              <a:t>The data-plane dimensions answers </a:t>
+            </a:r>
+            <a:r>
+              <a:rPr lang="en-US" sz="1700" b="1" dirty="0"/>
+              <a:t>which packet</a:t>
+            </a:r>
+            <a:r>
+              <a:rPr lang="en-US" sz="1700" dirty="0"/>
+              <a:t>. The control-plane </a:t>
+            </a:r>
+            <a:r>
+              <a:rPr lang="en-US" sz="1700" b="1" dirty="0"/>
+              <a:t>which service</a:t>
+            </a:r>
+            <a:r>
+              <a:rPr lang="en-US" sz="1700" dirty="0"/>
+              <a:t>. The device dimensions </a:t>
+            </a:r>
+            <a:r>
+              <a:rPr lang="en-US" sz="1700" b="1" dirty="0"/>
+              <a:t>where in the network</a:t>
+            </a:r>
+            <a:r>
+              <a:rPr lang="en-US" sz="1700" dirty="0"/>
+              <a:t>.</a:t>
+            </a:r>
+          </a:p>
+          <a:p>
+            <a:pPr marL="285750" indent="-285750">
+              <a:spcBef>
+                <a:spcPts val="300"/>
+              </a:spcBef>
+              <a:spcAft>
+                <a:spcPts val="300"/>
+              </a:spcAft>
+              <a:buFont typeface="Arial" panose="020B0604020202020204" pitchFamily="34" charset="0"/>
+              <a:buChar char="•"/>
+            </a:pPr>
+            <a:r>
+              <a:rPr lang="de-CH" sz="1700" dirty="0">
+                <a:solidFill>
+                  <a:srgbClr val="FF0000"/>
+                </a:solidFill>
+              </a:rPr>
+              <a:t>In </a:t>
+            </a:r>
+            <a:r>
+              <a:rPr lang="de-CH" sz="1700" dirty="0" err="1">
+                <a:solidFill>
+                  <a:srgbClr val="FF0000"/>
+                </a:solidFill>
+              </a:rPr>
+              <a:t>case</a:t>
+            </a:r>
+            <a:r>
+              <a:rPr lang="de-CH" sz="1700" dirty="0">
+                <a:solidFill>
+                  <a:srgbClr val="FF0000"/>
+                </a:solidFill>
+              </a:rPr>
+              <a:t> of </a:t>
+            </a:r>
+            <a:r>
+              <a:rPr lang="de-CH" sz="1700" dirty="0" err="1">
+                <a:solidFill>
+                  <a:srgbClr val="FF0000"/>
+                </a:solidFill>
+              </a:rPr>
+              <a:t>Inband</a:t>
+            </a:r>
+            <a:r>
+              <a:rPr lang="de-CH" sz="1700" dirty="0">
+                <a:solidFill>
+                  <a:srgbClr val="FF0000"/>
+                </a:solidFill>
+              </a:rPr>
+              <a:t> Telemetry, </a:t>
+            </a:r>
+            <a:r>
+              <a:rPr lang="en-US" sz="1700" b="1" dirty="0"/>
+              <a:t>a timestamp and optionally a direct export tag is added </a:t>
+            </a:r>
+            <a:r>
+              <a:rPr lang="en-US" sz="1700" dirty="0"/>
+              <a:t>to the packet header when entering the </a:t>
+            </a:r>
+            <a:r>
+              <a:rPr lang="en-US" sz="1700" dirty="0" err="1"/>
+              <a:t>Inband</a:t>
+            </a:r>
+            <a:r>
+              <a:rPr lang="en-US" sz="1700" dirty="0"/>
+              <a:t> Telemetry domain.</a:t>
+            </a:r>
+          </a:p>
+          <a:p>
+            <a:pPr marL="285750" indent="-285750">
+              <a:spcBef>
+                <a:spcPts val="300"/>
+              </a:spcBef>
+              <a:spcAft>
+                <a:spcPts val="300"/>
+              </a:spcAft>
+              <a:buFont typeface="Arial" panose="020B0604020202020204" pitchFamily="34" charset="0"/>
+              <a:buChar char="•"/>
+            </a:pPr>
+            <a:r>
+              <a:rPr lang="en-US" sz="1700" dirty="0"/>
+              <a:t>Each subsequent packet for the same flow increases byte and packet count. Each new flow creates a new flow ID in the flow cache.</a:t>
+            </a:r>
+          </a:p>
+          <a:p>
+            <a:pPr marL="285750" indent="-285750">
+              <a:spcBef>
+                <a:spcPts val="300"/>
+              </a:spcBef>
+              <a:spcAft>
+                <a:spcPts val="300"/>
+              </a:spcAft>
+            </a:pPr>
+            <a:r>
+              <a:rPr lang="de-CH" sz="1700" dirty="0">
+                <a:solidFill>
+                  <a:srgbClr val="FF0000"/>
+                </a:solidFill>
+              </a:rPr>
+              <a:t>In </a:t>
+            </a:r>
+            <a:r>
+              <a:rPr lang="de-CH" sz="1700" dirty="0" err="1">
+                <a:solidFill>
+                  <a:srgbClr val="FF0000"/>
+                </a:solidFill>
+              </a:rPr>
+              <a:t>case</a:t>
+            </a:r>
+            <a:r>
+              <a:rPr lang="de-CH" sz="1700" dirty="0">
+                <a:solidFill>
+                  <a:srgbClr val="FF0000"/>
+                </a:solidFill>
+              </a:rPr>
+              <a:t> of </a:t>
+            </a:r>
+            <a:r>
+              <a:rPr lang="de-CH" sz="1700" dirty="0" err="1">
+                <a:solidFill>
+                  <a:srgbClr val="FF0000"/>
+                </a:solidFill>
+              </a:rPr>
+              <a:t>Inband</a:t>
+            </a:r>
+            <a:r>
+              <a:rPr lang="de-CH" sz="1700" dirty="0">
+                <a:solidFill>
+                  <a:srgbClr val="FF0000"/>
+                </a:solidFill>
+              </a:rPr>
+              <a:t> Telemetry, </a:t>
+            </a:r>
+            <a:r>
+              <a:rPr lang="en-US" sz="1700" dirty="0"/>
+              <a:t>At each node in transit (postcard) or only at the last node (passport), </a:t>
+            </a:r>
+            <a:r>
+              <a:rPr lang="en-US" sz="1700" b="1" dirty="0"/>
+              <a:t>the delay is calculated by comparing the timestamp in the packet and when packet is received </a:t>
+            </a:r>
+            <a:r>
+              <a:rPr lang="en-US" sz="1700" dirty="0"/>
+              <a:t>on the node</a:t>
+            </a:r>
+            <a:r>
+              <a:rPr lang="en-US" sz="1700" b="1" dirty="0"/>
+              <a:t>. Delay is populated into the flow cache besides packet and byte count.</a:t>
+            </a:r>
+          </a:p>
+        </p:txBody>
+      </p:sp>
       <p:pic>
         <p:nvPicPr>
-          <p:cNvPr id="6" name="Picture 5">
-            <a:extLst>
-              <a:ext uri="{FF2B5EF4-FFF2-40B4-BE49-F238E27FC236}">
-                <a16:creationId xmlns:a16="http://schemas.microsoft.com/office/drawing/2014/main" id="{6054F088-8D4E-4189-829C-1B22E5CEB81A}"/>
+          <p:cNvPr id="5" name="Picture 4">
+            <a:extLst>
+              <a:ext uri="{FF2B5EF4-FFF2-40B4-BE49-F238E27FC236}">
+                <a16:creationId xmlns:a16="http://schemas.microsoft.com/office/drawing/2014/main" id="{EA3944B9-0180-4946-A0EF-FB3A1E94D8EE}"/>
               </a:ext>
             </a:extLst>
           </p:cNvPr>
@@ -6034,8 +8356,8 @@
         </p:blipFill>
         <p:spPr>
           <a:xfrm>
-            <a:off x="7179427" y="1505239"/>
-            <a:ext cx="4635542" cy="4788131"/>
+            <a:off x="936590" y="1690688"/>
+            <a:ext cx="4885090" cy="4683795"/>
           </a:xfrm>
           <a:prstGeom prst="rect">
             <a:avLst/>
@@ -6044,33 +8366,57 @@
       </p:pic>
       <p:sp>
         <p:nvSpPr>
-          <p:cNvPr id="2" name="Title 1">
-            <a:extLst>
-              <a:ext uri="{FF2B5EF4-FFF2-40B4-BE49-F238E27FC236}">
-                <a16:creationId xmlns:a16="http://schemas.microsoft.com/office/drawing/2014/main" id="{FF20F271-6F0D-4AC0-BB1D-F5C338165C13}"/>
-              </a:ext>
-            </a:extLst>
-          </p:cNvPr>
-          <p:cNvSpPr>
-            <a:spLocks noGrp="1"/>
-          </p:cNvSpPr>
-          <p:nvPr>
-            <p:ph type="title"/>
-          </p:nvPr>
-        </p:nvSpPr>
-        <p:spPr/>
-        <p:txBody>
-          <a:bodyPr>
+          <p:cNvPr id="7" name="Title 1">
+            <a:extLst>
+              <a:ext uri="{FF2B5EF4-FFF2-40B4-BE49-F238E27FC236}">
+                <a16:creationId xmlns:a16="http://schemas.microsoft.com/office/drawing/2014/main" id="{0CDE59DD-77FD-4C84-B32D-07354C792469}"/>
+              </a:ext>
+            </a:extLst>
+          </p:cNvPr>
+          <p:cNvSpPr txBox="1">
+            <a:spLocks/>
+          </p:cNvSpPr>
+          <p:nvPr/>
+        </p:nvSpPr>
+        <p:spPr bwMode="black">
+          <a:xfrm>
+            <a:off x="838200" y="365125"/>
+            <a:ext cx="10515600" cy="1325563"/>
+          </a:xfrm>
+          <a:prstGeom prst="rect">
+            <a:avLst/>
+          </a:prstGeom>
+        </p:spPr>
+        <p:txBody>
+          <a:bodyPr vert="horz" lIns="91440" tIns="45720" rIns="91440" bIns="45720" rtlCol="0" anchor="ctr">
             <a:normAutofit/>
           </a:bodyPr>
-          <a:lstStyle/>
+          <a:lstStyle>
+            <a:lvl1pPr algn="l" defTabSz="914400" rtl="0" eaLnBrk="1" latinLnBrk="0" hangingPunct="1">
+              <a:lnSpc>
+                <a:spcPct val="90000"/>
+              </a:lnSpc>
+              <a:spcBef>
+                <a:spcPct val="0"/>
+              </a:spcBef>
+              <a:buNone/>
+              <a:defRPr sz="4400" kern="1200">
+                <a:solidFill>
+                  <a:schemeClr val="tx1"/>
+                </a:solidFill>
+                <a:latin typeface="+mj-lt"/>
+                <a:ea typeface="+mj-ea"/>
+                <a:cs typeface="+mj-cs"/>
+              </a:defRPr>
+            </a:lvl1pPr>
+          </a:lstStyle>
           <a:p>
             <a:r>
               <a:rPr lang="en-US" sz="3100" b="1" dirty="0"/>
-              <a:t>Performance Registry</a:t>
+              <a:t>Measure delay and give network context</a:t>
             </a:r>
             <a:br>
-              <a:rPr lang="en-GB" sz="3600" dirty="0"/>
+              <a:rPr lang="en-GB" sz="3200" dirty="0"/>
             </a:br>
             <a:r>
               <a:rPr lang="en-US" sz="2700" dirty="0">
@@ -6080,132 +8426,15 @@
                   </a:schemeClr>
                 </a:solidFill>
               </a:rPr>
-              <a:t>Defining new entries</a:t>
-            </a:r>
-          </a:p>
-        </p:txBody>
-      </p:sp>
-      <p:sp>
-        <p:nvSpPr>
-          <p:cNvPr id="3" name="Content Placeholder 2">
-            <a:extLst>
-              <a:ext uri="{FF2B5EF4-FFF2-40B4-BE49-F238E27FC236}">
-                <a16:creationId xmlns:a16="http://schemas.microsoft.com/office/drawing/2014/main" id="{29C0DFD4-432D-4B0C-93DF-790441DCF5B9}"/>
-              </a:ext>
-            </a:extLst>
-          </p:cNvPr>
-          <p:cNvSpPr>
-            <a:spLocks noGrp="1"/>
-          </p:cNvSpPr>
-          <p:nvPr>
-            <p:ph idx="1"/>
-          </p:nvPr>
-        </p:nvSpPr>
-        <p:spPr>
-          <a:xfrm>
-            <a:off x="838200" y="1825625"/>
-            <a:ext cx="6161116" cy="4351338"/>
-          </a:xfrm>
-        </p:spPr>
-        <p:txBody>
-          <a:bodyPr>
-            <a:noAutofit/>
-          </a:bodyPr>
-          <a:lstStyle/>
-          <a:p>
-            <a:r>
-              <a:rPr lang="en-US" sz="1700" b="1" dirty="0"/>
-              <a:t>4 new IP One-Way Delay Hybrid Type I Passive Registry Entries.</a:t>
-            </a:r>
-            <a:br>
-              <a:rPr lang="en-US" sz="1700" dirty="0"/>
-            </a:br>
-            <a:endParaRPr lang="en-US" sz="1700" b="1" dirty="0"/>
-          </a:p>
-          <a:p>
-            <a:pPr lvl="1"/>
-            <a:r>
-              <a:rPr lang="en-US" sz="1700" b="1" dirty="0"/>
-              <a:t>Minimum Delay </a:t>
-            </a:r>
-            <a:r>
-              <a:rPr lang="en-US" sz="1700" dirty="0"/>
-              <a:t>– Describing the lowest delay of all accounted packets for a given flow id.</a:t>
-            </a:r>
-          </a:p>
-          <a:p>
-            <a:pPr lvl="1"/>
-            <a:r>
-              <a:rPr lang="en-US" sz="1700" b="1" dirty="0"/>
-              <a:t>Maximum Delay </a:t>
-            </a:r>
-            <a:r>
-              <a:rPr lang="en-US" sz="1700" dirty="0"/>
-              <a:t>– Describing the highest delay of all accounted packets for a given flow id.</a:t>
-            </a:r>
-          </a:p>
-          <a:p>
-            <a:pPr lvl="1"/>
-            <a:r>
-              <a:rPr lang="en-US" sz="1700" b="1" dirty="0"/>
-              <a:t>Sum of the Delay </a:t>
-            </a:r>
-            <a:r>
-              <a:rPr lang="en-US" sz="1700" dirty="0"/>
-              <a:t>– Describing the summed delay of all accounted packets for a given flow id.</a:t>
-            </a:r>
-          </a:p>
-          <a:p>
-            <a:pPr lvl="1"/>
-            <a:r>
-              <a:rPr lang="en-US" sz="1700" b="1" dirty="0"/>
-              <a:t>Mean Delay </a:t>
-            </a:r>
-            <a:r>
-              <a:rPr lang="en-US" sz="1700" dirty="0"/>
-              <a:t>– Describing the average delay of all accounted packets for a given flow id. Applicable only on data collection.</a:t>
-            </a:r>
-          </a:p>
-        </p:txBody>
-      </p:sp>
-      <p:sp>
-        <p:nvSpPr>
-          <p:cNvPr id="16" name="Slide Number Placeholder 1">
-            <a:extLst>
-              <a:ext uri="{FF2B5EF4-FFF2-40B4-BE49-F238E27FC236}">
-                <a16:creationId xmlns:a16="http://schemas.microsoft.com/office/drawing/2014/main" id="{4D0044F8-1C12-4A59-883A-7B56B9370029}"/>
-              </a:ext>
-            </a:extLst>
-          </p:cNvPr>
-          <p:cNvSpPr>
-            <a:spLocks noGrp="1"/>
-          </p:cNvSpPr>
-          <p:nvPr>
-            <p:ph type="sldNum" sz="quarter" idx="12"/>
-          </p:nvPr>
-        </p:nvSpPr>
-        <p:spPr>
-          <a:xfrm>
-            <a:off x="11607800" y="6362700"/>
-            <a:ext cx="414338" cy="365125"/>
-          </a:xfrm>
-        </p:spPr>
-        <p:txBody>
-          <a:bodyPr/>
-          <a:lstStyle/>
-          <a:p>
-            <a:fld id="{FC4AC485-25DE-431E-B345-9C0A15BB7F8A}" type="slidenum">
-              <a:rPr lang="en-US" sz="2200" smtClean="0"/>
-              <a:t>4</a:t>
-            </a:fld>
-            <a:endParaRPr lang="en-US" sz="2200"/>
+              <a:t>Enabling a statistical network delay view</a:t>
+            </a:r>
           </a:p>
         </p:txBody>
       </p:sp>
     </p:spTree>
     <p:extLst>
       <p:ext uri="{BB962C8B-B14F-4D97-AF65-F5344CB8AC3E}">
-        <p14:creationId xmlns:p14="http://schemas.microsoft.com/office/powerpoint/2010/main" val="728278235"/>
+        <p14:creationId xmlns:p14="http://schemas.microsoft.com/office/powerpoint/2010/main" val="3756297821"/>
       </p:ext>
     </p:extLst>
   </p:cSld>
@@ -6232,6 +8461,36 @@
           <a:chExt cx="0" cy="0"/>
         </a:xfrm>
       </p:grpSpPr>
+      <p:pic>
+        <p:nvPicPr>
+          <p:cNvPr id="6" name="Picture 5">
+            <a:extLst>
+              <a:ext uri="{FF2B5EF4-FFF2-40B4-BE49-F238E27FC236}">
+                <a16:creationId xmlns:a16="http://schemas.microsoft.com/office/drawing/2014/main" id="{6054F088-8D4E-4189-829C-1B22E5CEB81A}"/>
+              </a:ext>
+            </a:extLst>
+          </p:cNvPr>
+          <p:cNvPicPr>
+            <a:picLocks noChangeAspect="1"/>
+          </p:cNvPicPr>
+          <p:nvPr/>
+        </p:nvPicPr>
+        <p:blipFill>
+          <a:blip r:embed="rId2"/>
+          <a:stretch>
+            <a:fillRect/>
+          </a:stretch>
+        </p:blipFill>
+        <p:spPr>
+          <a:xfrm>
+            <a:off x="7179427" y="1505239"/>
+            <a:ext cx="4635542" cy="4788131"/>
+          </a:xfrm>
+          <a:prstGeom prst="rect">
+            <a:avLst/>
+          </a:prstGeom>
+        </p:spPr>
+      </p:pic>
       <p:sp>
         <p:nvSpPr>
           <p:cNvPr id="2" name="Title 1">
@@ -6257,7 +8516,7 @@
           <a:p>
             <a:r>
               <a:rPr lang="en-US" sz="3100" b="1" dirty="0"/>
-              <a:t>IPFIX Registry</a:t>
+              <a:t>Performance Registry</a:t>
             </a:r>
             <a:br>
               <a:rPr lang="en-GB" sz="3600" dirty="0"/>
@@ -6305,7 +8564,7 @@
           <a:p>
             <a:r>
               <a:rPr lang="en-US" sz="1700" b="1" dirty="0"/>
-              <a:t>8 new Path Delay Registry Entries.</a:t>
+              <a:t>4 new IP One-Way Delay Hybrid Type I Passive Registry Entries.</a:t>
             </a:r>
             <a:br>
               <a:rPr lang="en-US" sz="1700" dirty="0"/>
@@ -6320,15 +8579,7 @@
             </a:r>
             <a:r>
               <a:rPr lang="en-US" sz="1700" dirty="0"/>
-              <a:t>– Describing the lowest delay of all accounted packets for a given flow id in </a:t>
-            </a:r>
-            <a:r>
-              <a:rPr lang="en-US" sz="1700" b="1" dirty="0"/>
-              <a:t>micro or in nanoseconds</a:t>
-            </a:r>
-            <a:r>
-              <a:rPr lang="en-US" sz="1700" dirty="0"/>
-              <a:t>.</a:t>
+              <a:t>– Describing the lowest delay of all accounted packets for a given flow id.</a:t>
             </a:r>
           </a:p>
           <a:p>
@@ -6339,15 +8590,7 @@
             </a:r>
             <a:r>
               <a:rPr lang="en-US" sz="1700" dirty="0"/>
-              <a:t>– Describing the highest delay of all accounted packets for a given flow id in </a:t>
-            </a:r>
-            <a:r>
-              <a:rPr lang="en-US" sz="1700" b="1" dirty="0"/>
-              <a:t>micro or in nanoseconds</a:t>
-            </a:r>
-            <a:r>
-              <a:rPr lang="en-US" sz="1700" dirty="0"/>
-              <a:t>.</a:t>
+              <a:t>– Describing the highest delay of all accounted packets for a given flow id.</a:t>
             </a:r>
           </a:p>
           <a:p>
@@ -6358,15 +8601,7 @@
             </a:r>
             <a:r>
               <a:rPr lang="en-US" sz="1700" dirty="0"/>
-              <a:t>– Describing the summed delay of all accounted packets for a given flow id in </a:t>
-            </a:r>
-            <a:r>
-              <a:rPr lang="en-US" sz="1700" b="1" dirty="0"/>
-              <a:t>micro or in nanoseconds</a:t>
-            </a:r>
-            <a:r>
-              <a:rPr lang="en-US" sz="1700" dirty="0"/>
-              <a:t>.</a:t>
+              <a:t>– Describing the summed delay of all accounted packets for a given flow id.</a:t>
             </a:r>
           </a:p>
           <a:p>
@@ -6377,15 +8612,7 @@
             </a:r>
             <a:r>
               <a:rPr lang="en-US" sz="1700" dirty="0"/>
-              <a:t>– Describing the average delay of all accounted packets for a given flow id in </a:t>
-            </a:r>
-            <a:r>
-              <a:rPr lang="en-US" sz="1700" b="1" dirty="0"/>
-              <a:t>micro or in nanoseconds</a:t>
-            </a:r>
-            <a:r>
-              <a:rPr lang="en-US" sz="1700" dirty="0"/>
-              <a:t>. Applicable only on data collection.</a:t>
+              <a:t>– Describing the average delay of all accounted packets for a given flow id. Applicable only on data collection.</a:t>
             </a:r>
           </a:p>
         </p:txBody>
@@ -6419,6 +8646,228 @@
             <a:fld id="{FC4AC485-25DE-431E-B345-9C0A15BB7F8A}" type="slidenum">
               <a:rPr lang="en-US" sz="2200" smtClean="0"/>
               <a:t>5</a:t>
+            </a:fld>
+            <a:endParaRPr lang="en-US" sz="2200"/>
+          </a:p>
+        </p:txBody>
+      </p:sp>
+    </p:spTree>
+    <p:extLst>
+      <p:ext uri="{BB962C8B-B14F-4D97-AF65-F5344CB8AC3E}">
+        <p14:creationId xmlns:p14="http://schemas.microsoft.com/office/powerpoint/2010/main" val="728278235"/>
+      </p:ext>
+    </p:extLst>
+  </p:cSld>
+  <p:clrMapOvr>
+    <a:masterClrMapping/>
+  </p:clrMapOvr>
+</p:sld>
+</file>
+
+<file path=ppt/slides/slide6.xml><?xml version="1.0" encoding="utf-8"?>
+<p:sld xmlns:a="http://schemas.openxmlformats.org/drawingml/2006/main" xmlns:r="http://schemas.openxmlformats.org/officeDocument/2006/relationships" xmlns:p="http://schemas.openxmlformats.org/presentationml/2006/main">
+  <p:cSld>
+    <p:spTree>
+      <p:nvGrpSpPr>
+        <p:cNvPr id="1" name=""/>
+        <p:cNvGrpSpPr/>
+        <p:nvPr/>
+      </p:nvGrpSpPr>
+      <p:grpSpPr>
+        <a:xfrm>
+          <a:off x="0" y="0"/>
+          <a:ext cx="0" cy="0"/>
+          <a:chOff x="0" y="0"/>
+          <a:chExt cx="0" cy="0"/>
+        </a:xfrm>
+      </p:grpSpPr>
+      <p:sp>
+        <p:nvSpPr>
+          <p:cNvPr id="2" name="Title 1">
+            <a:extLst>
+              <a:ext uri="{FF2B5EF4-FFF2-40B4-BE49-F238E27FC236}">
+                <a16:creationId xmlns:a16="http://schemas.microsoft.com/office/drawing/2014/main" id="{FF20F271-6F0D-4AC0-BB1D-F5C338165C13}"/>
+              </a:ext>
+            </a:extLst>
+          </p:cNvPr>
+          <p:cNvSpPr>
+            <a:spLocks noGrp="1"/>
+          </p:cNvSpPr>
+          <p:nvPr>
+            <p:ph type="title"/>
+          </p:nvPr>
+        </p:nvSpPr>
+        <p:spPr/>
+        <p:txBody>
+          <a:bodyPr>
+            <a:normAutofit/>
+          </a:bodyPr>
+          <a:lstStyle/>
+          <a:p>
+            <a:r>
+              <a:rPr lang="en-US" sz="3100" b="1" dirty="0"/>
+              <a:t>IPFIX Registry</a:t>
+            </a:r>
+            <a:br>
+              <a:rPr lang="en-GB" sz="3600" dirty="0"/>
+            </a:br>
+            <a:r>
+              <a:rPr lang="en-US" sz="2700" dirty="0">
+                <a:solidFill>
+                  <a:schemeClr val="bg2">
+                    <a:lumMod val="75000"/>
+                  </a:schemeClr>
+                </a:solidFill>
+              </a:rPr>
+              <a:t>Defining new entries</a:t>
+            </a:r>
+          </a:p>
+        </p:txBody>
+      </p:sp>
+      <p:sp>
+        <p:nvSpPr>
+          <p:cNvPr id="3" name="Content Placeholder 2">
+            <a:extLst>
+              <a:ext uri="{FF2B5EF4-FFF2-40B4-BE49-F238E27FC236}">
+                <a16:creationId xmlns:a16="http://schemas.microsoft.com/office/drawing/2014/main" id="{29C0DFD4-432D-4B0C-93DF-790441DCF5B9}"/>
+              </a:ext>
+            </a:extLst>
+          </p:cNvPr>
+          <p:cNvSpPr>
+            <a:spLocks noGrp="1"/>
+          </p:cNvSpPr>
+          <p:nvPr>
+            <p:ph idx="1"/>
+          </p:nvPr>
+        </p:nvSpPr>
+        <p:spPr>
+          <a:xfrm>
+            <a:off x="838200" y="1825625"/>
+            <a:ext cx="6161116" cy="4351338"/>
+          </a:xfrm>
+        </p:spPr>
+        <p:txBody>
+          <a:bodyPr>
+            <a:noAutofit/>
+          </a:bodyPr>
+          <a:lstStyle/>
+          <a:p>
+            <a:r>
+              <a:rPr lang="en-US" sz="1700" b="1" dirty="0"/>
+              <a:t>8 new Path Delay Registry Entries.</a:t>
+            </a:r>
+            <a:br>
+              <a:rPr lang="en-US" sz="1700" dirty="0"/>
+            </a:br>
+            <a:endParaRPr lang="en-US" sz="1700" b="1" dirty="0"/>
+          </a:p>
+          <a:p>
+            <a:pPr lvl="1"/>
+            <a:r>
+              <a:rPr lang="en-US" sz="1700" b="1" dirty="0"/>
+              <a:t>Minimum Delay </a:t>
+            </a:r>
+            <a:r>
+              <a:rPr lang="en-US" sz="1700" dirty="0"/>
+              <a:t>– Describing the lowest delay of all accounted packets for a given flow id in </a:t>
+            </a:r>
+            <a:r>
+              <a:rPr lang="en-US" sz="1700" b="1" dirty="0"/>
+              <a:t>micro or in nanoseconds</a:t>
+            </a:r>
+            <a:r>
+              <a:rPr lang="en-US" sz="1700" dirty="0"/>
+              <a:t>.</a:t>
+            </a:r>
+          </a:p>
+          <a:p>
+            <a:pPr lvl="1"/>
+            <a:r>
+              <a:rPr lang="en-US" sz="1700" b="1" dirty="0"/>
+              <a:t>Maximum Delay </a:t>
+            </a:r>
+            <a:r>
+              <a:rPr lang="en-US" sz="1700" dirty="0"/>
+              <a:t>– Describing the highest delay of all accounted packets for a given flow id in </a:t>
+            </a:r>
+            <a:r>
+              <a:rPr lang="en-US" sz="1700" b="1" dirty="0"/>
+              <a:t>micro or in nanoseconds</a:t>
+            </a:r>
+            <a:r>
+              <a:rPr lang="en-US" sz="1700" dirty="0"/>
+              <a:t>.</a:t>
+            </a:r>
+          </a:p>
+          <a:p>
+            <a:pPr lvl="1"/>
+            <a:r>
+              <a:rPr lang="en-US" sz="1700" b="1" dirty="0"/>
+              <a:t>Sum of the Delay </a:t>
+            </a:r>
+            <a:r>
+              <a:rPr lang="en-US" sz="1700" dirty="0"/>
+              <a:t>– Describing the summed delay of all accounted packets for a given flow id in </a:t>
+            </a:r>
+            <a:r>
+              <a:rPr lang="en-US" sz="1700" b="1" dirty="0"/>
+              <a:t>micro or in nanoseconds</a:t>
+            </a:r>
+            <a:r>
+              <a:rPr lang="en-US" sz="1700" dirty="0"/>
+              <a:t>.</a:t>
+            </a:r>
+          </a:p>
+          <a:p>
+            <a:pPr lvl="1"/>
+            <a:r>
+              <a:rPr lang="en-US" sz="1700" b="1" dirty="0"/>
+              <a:t>Mean Delay </a:t>
+            </a:r>
+            <a:r>
+              <a:rPr lang="en-US" sz="1700" dirty="0"/>
+              <a:t>– Describing the average delay of all accounted packets for a given flow id in </a:t>
+            </a:r>
+            <a:r>
+              <a:rPr lang="en-US" sz="1700" b="1" dirty="0"/>
+              <a:t>micro or in nanoseconds</a:t>
+            </a:r>
+            <a:r>
+              <a:rPr lang="en-US" sz="1700" dirty="0"/>
+              <a:t>. Applicable only on data collection.</a:t>
+            </a:r>
+          </a:p>
+        </p:txBody>
+      </p:sp>
+      <p:sp>
+        <p:nvSpPr>
+          <p:cNvPr id="16" name="Slide Number Placeholder 1">
+            <a:extLst>
+              <a:ext uri="{FF2B5EF4-FFF2-40B4-BE49-F238E27FC236}">
+                <a16:creationId xmlns:a16="http://schemas.microsoft.com/office/drawing/2014/main" id="{4D0044F8-1C12-4A59-883A-7B56B9370029}"/>
+              </a:ext>
+            </a:extLst>
+          </p:cNvPr>
+          <p:cNvSpPr>
+            <a:spLocks noGrp="1"/>
+          </p:cNvSpPr>
+          <p:nvPr>
+            <p:ph type="sldNum" sz="quarter" idx="12"/>
+          </p:nvPr>
+        </p:nvSpPr>
+        <p:spPr>
+          <a:xfrm>
+            <a:off x="11607800" y="6362700"/>
+            <a:ext cx="414338" cy="365125"/>
+          </a:xfrm>
+        </p:spPr>
+        <p:txBody>
+          <a:bodyPr/>
+          <a:lstStyle/>
+          <a:p>
+            <a:fld id="{FC4AC485-25DE-431E-B345-9C0A15BB7F8A}" type="slidenum">
+              <a:rPr lang="en-US" sz="2200" smtClean="0"/>
+              <a:t>6</a:t>
             </a:fld>
             <a:endParaRPr lang="en-US" sz="2200"/>
           </a:p>
@@ -6467,7 +8916,7 @@
 </p:sld>
 </file>
 
-<file path=ppt/slides/slide6.xml><?xml version="1.0" encoding="utf-8"?>
+<file path=ppt/slides/slide7.xml><?xml version="1.0" encoding="utf-8"?>
 <p:sld xmlns:a="http://schemas.openxmlformats.org/drawingml/2006/main" xmlns:r="http://schemas.openxmlformats.org/officeDocument/2006/relationships" xmlns:p="http://schemas.openxmlformats.org/presentationml/2006/main">
   <p:cSld>
     <p:spTree>
@@ -6657,7 +9106,7 @@
           <a:p>
             <a:fld id="{FC4AC485-25DE-431E-B345-9C0A15BB7F8A}" type="slidenum">
               <a:rPr lang="en-US" sz="2200" smtClean="0"/>
-              <a:t>6</a:t>
+              <a:t>7</a:t>
             </a:fld>
             <a:endParaRPr lang="en-US" sz="2200"/>
           </a:p>

</xml_diff>